<commit_message>
new version. tweaked  guidance on when to make Equivalent Class.
git-svn-id: https://oboformat.googlecode.com/svn/docs/tutorial@488 3e622410-f0ad-ce59-49ea-9bf623c22f00
</commit_message>
<xml_diff>
--- a/presentations/GO_protege_1201b.pptx
+++ b/presentations/GO_protege_1201b.pptx
@@ -5,7 +5,7 @@
     <p:sldMasterId id="2147483660" r:id="rId1"/>
   </p:sldMasterIdLst>
   <p:notesMasterIdLst>
-    <p:notesMasterId r:id="rId39"/>
+    <p:notesMasterId r:id="rId38"/>
   </p:notesMasterIdLst>
   <p:sldIdLst>
     <p:sldId id="256" r:id="rId2"/>
@@ -44,7 +44,6 @@
     <p:sldId id="384" r:id="rId35"/>
     <p:sldId id="399" r:id="rId36"/>
     <p:sldId id="404" r:id="rId37"/>
-    <p:sldId id="402" r:id="rId38"/>
   </p:sldIdLst>
   <p:sldSz cx="9144000" cy="6858000" type="screen4x3"/>
   <p:notesSz cx="6858000" cy="9144000"/>
@@ -1026,6 +1025,104 @@
               <a:rPr lang="en-US" smtClean="0"/>
               <a:pPr/>
               <a:t>20</a:t>
+            </a:fld>
+            <a:endParaRPr lang="en-US"/>
+          </a:p>
+        </p:txBody>
+      </p:sp>
+    </p:spTree>
+  </p:cSld>
+  <p:clrMapOvr>
+    <a:masterClrMapping/>
+  </p:clrMapOvr>
+</p:notes>
+</file>
+
+<file path=ppt/notesSlides/notesSlide7.xml><?xml version="1.0" encoding="utf-8"?>
+<p:notes xmlns:a="http://schemas.openxmlformats.org/drawingml/2006/main" xmlns:r="http://schemas.openxmlformats.org/officeDocument/2006/relationships" xmlns:mc="http://schemas.openxmlformats.org/markup-compatibility/2006" xmlns:mv="urn:schemas-microsoft-com:mac:vml" xmlns:p="http://schemas.openxmlformats.org/presentationml/2006/main" mc:Ignorable="mv" mc:PreserveAttributes="mv:*">
+  <p:cSld>
+    <p:spTree>
+      <p:nvGrpSpPr>
+        <p:cNvPr id="1" name=""/>
+        <p:cNvGrpSpPr/>
+        <p:nvPr/>
+      </p:nvGrpSpPr>
+      <p:grpSpPr>
+        <a:xfrm>
+          <a:off x="0" y="0"/>
+          <a:ext cx="0" cy="0"/>
+          <a:chOff x="0" y="0"/>
+          <a:chExt cx="0" cy="0"/>
+        </a:xfrm>
+      </p:grpSpPr>
+      <p:sp>
+        <p:nvSpPr>
+          <p:cNvPr id="2" name="Slide Image Placeholder 1"/>
+          <p:cNvSpPr>
+            <a:spLocks noGrp="1" noRot="1" noChangeAspect="1"/>
+          </p:cNvSpPr>
+          <p:nvPr>
+            <p:ph type="sldImg"/>
+          </p:nvPr>
+        </p:nvSpPr>
+        <p:spPr/>
+      </p:sp>
+      <p:sp>
+        <p:nvSpPr>
+          <p:cNvPr id="3" name="Notes Placeholder 2"/>
+          <p:cNvSpPr>
+            <a:spLocks noGrp="1"/>
+          </p:cNvSpPr>
+          <p:nvPr>
+            <p:ph type="body" idx="1"/>
+          </p:nvPr>
+        </p:nvSpPr>
+        <p:spPr/>
+        <p:txBody>
+          <a:bodyPr>
+            <a:normAutofit/>
+          </a:bodyPr>
+          <a:lstStyle/>
+          <a:p>
+            <a:r>
+              <a:rPr lang="en-US" dirty="0" smtClean="0"/>
+              <a:t>The point is not to read all the text,</a:t>
+            </a:r>
+            <a:r>
+              <a:rPr lang="en-US" baseline="0" dirty="0" smtClean="0"/>
+              <a:t> just to note that it is complicated.  Note that this approach differs from Simon’s, as I understand it, of making formal </a:t>
+            </a:r>
+            <a:r>
+              <a:rPr lang="en-US" baseline="0" dirty="0" err="1" smtClean="0"/>
+              <a:t>defs</a:t>
+            </a:r>
+            <a:r>
+              <a:rPr lang="en-US" baseline="0" dirty="0" smtClean="0"/>
+              <a:t> primary and aiming for complete Rector demoralization.</a:t>
+            </a:r>
+            <a:endParaRPr lang="en-US" dirty="0"/>
+          </a:p>
+        </p:txBody>
+      </p:sp>
+      <p:sp>
+        <p:nvSpPr>
+          <p:cNvPr id="4" name="Slide Number Placeholder 3"/>
+          <p:cNvSpPr>
+            <a:spLocks noGrp="1"/>
+          </p:cNvSpPr>
+          <p:nvPr>
+            <p:ph type="sldNum" sz="quarter" idx="10"/>
+          </p:nvPr>
+        </p:nvSpPr>
+        <p:spPr/>
+        <p:txBody>
+          <a:bodyPr/>
+          <a:lstStyle/>
+          <a:p>
+            <a:fld id="{AEDE96F4-7F16-8045-9CD7-18F1B353FF60}" type="slidenum">
+              <a:rPr lang="en-US" smtClean="0"/>
+              <a:pPr/>
+              <a:t>23</a:t>
             </a:fld>
             <a:endParaRPr lang="en-US"/>
           </a:p>
@@ -14898,7 +14995,7 @@
         <p:spPr/>
         <p:txBody>
           <a:bodyPr>
-            <a:normAutofit fontScale="92500" lnSpcReduction="20000"/>
+            <a:normAutofit fontScale="92500" lnSpcReduction="10000"/>
           </a:bodyPr>
           <a:lstStyle/>
           <a:p>
@@ -14920,21 +15017,28 @@
             </a:r>
             <a:r>
               <a:rPr lang="en-US" dirty="0" smtClean="0"/>
-              <a:t> hierarchy is maintained by hand.  </a:t>
-            </a:r>
-          </a:p>
-          <a:p>
-            <a:endParaRPr lang="en-US" dirty="0" smtClean="0"/>
+              <a:t> hierarchy is maintained by hand.</a:t>
+            </a:r>
+          </a:p>
+          <a:p>
+            <a:r>
+              <a:rPr lang="en-US" dirty="0" smtClean="0"/>
+              <a:t>Only add equivalent class definitions when you are confident you can completely </a:t>
+            </a:r>
+            <a:r>
+              <a:rPr lang="en-US" dirty="0" err="1" smtClean="0"/>
+              <a:t>formalise</a:t>
+            </a:r>
+            <a:r>
+              <a:rPr lang="en-US" dirty="0" smtClean="0"/>
+              <a:t> a definition.</a:t>
+            </a:r>
           </a:p>
           <a:p>
             <a:r>
               <a:rPr lang="en-US" dirty="0" smtClean="0"/>
               <a:t>Automating  classification is often hard. How would you define this using an equivalent class statement:</a:t>
             </a:r>
-          </a:p>
-          <a:p>
-            <a:pPr lvl="1"/>
-            <a:endParaRPr lang="en-US" dirty="0" smtClean="0"/>
           </a:p>
           <a:p>
             <a:pPr lvl="1"/>
@@ -22882,69 +22986,6 @@
       </p:par>
     </p:tnLst>
   </p:timing>
-</p:sld>
-</file>
-
-<file path=ppt/slides/slide37.xml><?xml version="1.0" encoding="utf-8"?>
-<p:sld xmlns:a="http://schemas.openxmlformats.org/drawingml/2006/main" xmlns:r="http://schemas.openxmlformats.org/officeDocument/2006/relationships" xmlns:mc="http://schemas.openxmlformats.org/markup-compatibility/2006" xmlns:mv="urn:schemas-microsoft-com:mac:vml" xmlns:p="http://schemas.openxmlformats.org/presentationml/2006/main" mc:Ignorable="mv" mc:PreserveAttributes="mv:*">
-  <p:cSld>
-    <p:spTree>
-      <p:nvGrpSpPr>
-        <p:cNvPr id="1" name=""/>
-        <p:cNvGrpSpPr/>
-        <p:nvPr/>
-      </p:nvGrpSpPr>
-      <p:grpSpPr>
-        <a:xfrm>
-          <a:off x="0" y="0"/>
-          <a:ext cx="0" cy="0"/>
-          <a:chOff x="0" y="0"/>
-          <a:chExt cx="0" cy="0"/>
-        </a:xfrm>
-      </p:grpSpPr>
-      <p:sp>
-        <p:nvSpPr>
-          <p:cNvPr id="2" name="Title 1"/>
-          <p:cNvSpPr>
-            <a:spLocks noGrp="1"/>
-          </p:cNvSpPr>
-          <p:nvPr>
-            <p:ph type="title"/>
-          </p:nvPr>
-        </p:nvSpPr>
-        <p:spPr/>
-        <p:txBody>
-          <a:bodyPr/>
-          <a:lstStyle/>
-          <a:p>
-            <a:endParaRPr lang="en-US"/>
-          </a:p>
-        </p:txBody>
-      </p:sp>
-      <p:sp>
-        <p:nvSpPr>
-          <p:cNvPr id="3" name="Content Placeholder 2"/>
-          <p:cNvSpPr>
-            <a:spLocks noGrp="1"/>
-          </p:cNvSpPr>
-          <p:nvPr>
-            <p:ph idx="1"/>
-          </p:nvPr>
-        </p:nvSpPr>
-        <p:spPr/>
-        <p:txBody>
-          <a:bodyPr/>
-          <a:lstStyle/>
-          <a:p>
-            <a:endParaRPr lang="en-US"/>
-          </a:p>
-        </p:txBody>
-      </p:sp>
-    </p:spTree>
-  </p:cSld>
-  <p:clrMapOvr>
-    <a:masterClrMapping/>
-  </p:clrMapOvr>
 </p:sld>
 </file>
 

</xml_diff>

<commit_message>
Added a few more notes.
git-svn-id: https://oboformat.googlecode.com/svn/docs/tutorial@489 3e622410-f0ad-ce59-49ea-9bf623c22f00
</commit_message>
<xml_diff>
--- a/presentations/GO_protege_1201b.pptx
+++ b/presentations/GO_protege_1201b.pptx
@@ -1123,6 +1123,198 @@
               <a:rPr lang="en-US" smtClean="0"/>
               <a:pPr/>
               <a:t>23</a:t>
+            </a:fld>
+            <a:endParaRPr lang="en-US"/>
+          </a:p>
+        </p:txBody>
+      </p:sp>
+    </p:spTree>
+  </p:cSld>
+  <p:clrMapOvr>
+    <a:masterClrMapping/>
+  </p:clrMapOvr>
+</p:notes>
+</file>
+
+<file path=ppt/notesSlides/notesSlide8.xml><?xml version="1.0" encoding="utf-8"?>
+<p:notes xmlns:a="http://schemas.openxmlformats.org/drawingml/2006/main" xmlns:r="http://schemas.openxmlformats.org/officeDocument/2006/relationships" xmlns:mc="http://schemas.openxmlformats.org/markup-compatibility/2006" xmlns:mv="urn:schemas-microsoft-com:mac:vml" xmlns:p="http://schemas.openxmlformats.org/presentationml/2006/main" mc:Ignorable="mv" mc:PreserveAttributes="mv:*">
+  <p:cSld>
+    <p:spTree>
+      <p:nvGrpSpPr>
+        <p:cNvPr id="1" name=""/>
+        <p:cNvGrpSpPr/>
+        <p:nvPr/>
+      </p:nvGrpSpPr>
+      <p:grpSpPr>
+        <a:xfrm>
+          <a:off x="0" y="0"/>
+          <a:ext cx="0" cy="0"/>
+          <a:chOff x="0" y="0"/>
+          <a:chExt cx="0" cy="0"/>
+        </a:xfrm>
+      </p:grpSpPr>
+      <p:sp>
+        <p:nvSpPr>
+          <p:cNvPr id="2" name="Slide Image Placeholder 1"/>
+          <p:cNvSpPr>
+            <a:spLocks noGrp="1" noRot="1" noChangeAspect="1"/>
+          </p:cNvSpPr>
+          <p:nvPr>
+            <p:ph type="sldImg"/>
+          </p:nvPr>
+        </p:nvSpPr>
+        <p:spPr/>
+      </p:sp>
+      <p:sp>
+        <p:nvSpPr>
+          <p:cNvPr id="3" name="Notes Placeholder 2"/>
+          <p:cNvSpPr>
+            <a:spLocks noGrp="1"/>
+          </p:cNvSpPr>
+          <p:nvPr>
+            <p:ph type="body" idx="1"/>
+          </p:nvPr>
+        </p:nvSpPr>
+        <p:spPr/>
+        <p:txBody>
+          <a:bodyPr>
+            <a:normAutofit/>
+          </a:bodyPr>
+          <a:lstStyle/>
+          <a:p>
+            <a:r>
+              <a:rPr lang="en-US" dirty="0" smtClean="0"/>
+              <a:t>Slightly </a:t>
+            </a:r>
+            <a:r>
+              <a:rPr lang="en-US" dirty="0" err="1" smtClean="0"/>
+              <a:t>patronising</a:t>
+            </a:r>
+            <a:r>
+              <a:rPr lang="en-US" dirty="0" smtClean="0"/>
+              <a:t> slide,</a:t>
+            </a:r>
+            <a:r>
+              <a:rPr lang="en-US" baseline="0" dirty="0" smtClean="0"/>
+              <a:t> but made this because I think non-coders often think having lots of error messages is a chore.  I know I used to.</a:t>
+            </a:r>
+            <a:endParaRPr lang="en-US" dirty="0"/>
+          </a:p>
+        </p:txBody>
+      </p:sp>
+      <p:sp>
+        <p:nvSpPr>
+          <p:cNvPr id="4" name="Slide Number Placeholder 3"/>
+          <p:cNvSpPr>
+            <a:spLocks noGrp="1"/>
+          </p:cNvSpPr>
+          <p:nvPr>
+            <p:ph type="sldNum" sz="quarter" idx="10"/>
+          </p:nvPr>
+        </p:nvSpPr>
+        <p:spPr/>
+        <p:txBody>
+          <a:bodyPr/>
+          <a:lstStyle/>
+          <a:p>
+            <a:fld id="{AEDE96F4-7F16-8045-9CD7-18F1B353FF60}" type="slidenum">
+              <a:rPr lang="en-US" smtClean="0"/>
+              <a:pPr/>
+              <a:t>27</a:t>
+            </a:fld>
+            <a:endParaRPr lang="en-US"/>
+          </a:p>
+        </p:txBody>
+      </p:sp>
+    </p:spTree>
+  </p:cSld>
+  <p:clrMapOvr>
+    <a:masterClrMapping/>
+  </p:clrMapOvr>
+</p:notes>
+</file>
+
+<file path=ppt/notesSlides/notesSlide9.xml><?xml version="1.0" encoding="utf-8"?>
+<p:notes xmlns:a="http://schemas.openxmlformats.org/drawingml/2006/main" xmlns:r="http://schemas.openxmlformats.org/officeDocument/2006/relationships" xmlns:mc="http://schemas.openxmlformats.org/markup-compatibility/2006" xmlns:mv="urn:schemas-microsoft-com:mac:vml" xmlns:p="http://schemas.openxmlformats.org/presentationml/2006/main" mc:Ignorable="mv" mc:PreserveAttributes="mv:*">
+  <p:cSld>
+    <p:spTree>
+      <p:nvGrpSpPr>
+        <p:cNvPr id="1" name=""/>
+        <p:cNvGrpSpPr/>
+        <p:nvPr/>
+      </p:nvGrpSpPr>
+      <p:grpSpPr>
+        <a:xfrm>
+          <a:off x="0" y="0"/>
+          <a:ext cx="0" cy="0"/>
+          <a:chOff x="0" y="0"/>
+          <a:chExt cx="0" cy="0"/>
+        </a:xfrm>
+      </p:grpSpPr>
+      <p:sp>
+        <p:nvSpPr>
+          <p:cNvPr id="2" name="Slide Image Placeholder 1"/>
+          <p:cNvSpPr>
+            <a:spLocks noGrp="1" noRot="1" noChangeAspect="1"/>
+          </p:cNvSpPr>
+          <p:nvPr>
+            <p:ph type="sldImg"/>
+          </p:nvPr>
+        </p:nvSpPr>
+        <p:spPr/>
+      </p:sp>
+      <p:sp>
+        <p:nvSpPr>
+          <p:cNvPr id="3" name="Notes Placeholder 2"/>
+          <p:cNvSpPr>
+            <a:spLocks noGrp="1"/>
+          </p:cNvSpPr>
+          <p:nvPr>
+            <p:ph type="body" idx="1"/>
+          </p:nvPr>
+        </p:nvSpPr>
+        <p:spPr/>
+        <p:txBody>
+          <a:bodyPr>
+            <a:normAutofit/>
+          </a:bodyPr>
+          <a:lstStyle/>
+          <a:p>
+            <a:r>
+              <a:rPr lang="en-US" dirty="0" smtClean="0"/>
+              <a:t>Last point will be dealt</a:t>
+            </a:r>
+            <a:r>
+              <a:rPr lang="en-US" baseline="0" dirty="0" smtClean="0"/>
+              <a:t> with later </a:t>
+            </a:r>
+            <a:r>
+              <a:rPr lang="en-US" baseline="0" smtClean="0"/>
+              <a:t>by Chris.</a:t>
+            </a:r>
+            <a:endParaRPr lang="en-US"/>
+          </a:p>
+        </p:txBody>
+      </p:sp>
+      <p:sp>
+        <p:nvSpPr>
+          <p:cNvPr id="4" name="Slide Number Placeholder 3"/>
+          <p:cNvSpPr>
+            <a:spLocks noGrp="1"/>
+          </p:cNvSpPr>
+          <p:nvPr>
+            <p:ph type="sldNum" sz="quarter" idx="10"/>
+          </p:nvPr>
+        </p:nvSpPr>
+        <p:spPr/>
+        <p:txBody>
+          <a:bodyPr/>
+          <a:lstStyle/>
+          <a:p>
+            <a:fld id="{AEDE96F4-7F16-8045-9CD7-18F1B353FF60}" type="slidenum">
+              <a:rPr lang="en-US" smtClean="0"/>
+              <a:pPr/>
+              <a:t>36</a:t>
             </a:fld>
             <a:endParaRPr lang="en-US"/>
           </a:p>

</xml_diff>

<commit_message>
Modified to update some examples.
</commit_message>
<xml_diff>
--- a/presentations/GO_protege_1201b.pptx
+++ b/presentations/GO_protege_1201b.pptx
@@ -1,6 +1,6 @@
 
 <file path=ppt/presentation.xml><?xml version="1.0" encoding="utf-8"?>
-<p:presentation xmlns:a="http://schemas.openxmlformats.org/drawingml/2006/main" xmlns:r="http://schemas.openxmlformats.org/officeDocument/2006/relationships" xmlns:mc="http://schemas.openxmlformats.org/markup-compatibility/2006" xmlns:mv="urn:schemas-microsoft-com:mac:vml" xmlns:p="http://schemas.openxmlformats.org/presentationml/2006/main" mc:Ignorable="mv" mc:PreserveAttributes="mv:*" saveSubsetFonts="1" autoCompressPictures="0">
+<p:presentation xmlns:a="http://schemas.openxmlformats.org/drawingml/2006/main" xmlns:r="http://schemas.openxmlformats.org/officeDocument/2006/relationships" xmlns:p="http://schemas.openxmlformats.org/presentationml/2006/main" saveSubsetFonts="1" autoCompressPictures="0">
   <p:sldMasterIdLst>
     <p:sldMasterId id="2147483660" r:id="rId1"/>
   </p:sldMasterIdLst>
@@ -142,11 +142,27 @@
       </a:defRPr>
     </a:lvl9pPr>
   </p:defaultTextStyle>
+  <p:extLst>
+    <p:ext uri="{EFAFB233-063F-42B5-8137-9DF3F51BA10A}">
+      <p15:sldGuideLst xmlns:p15="http://schemas.microsoft.com/office/powerpoint/2012/main">
+        <p15:guide id="1" orient="horz" pos="2910">
+          <p15:clr>
+            <a:srgbClr val="A4A3A4"/>
+          </p15:clr>
+        </p15:guide>
+        <p15:guide id="2" pos="2958">
+          <p15:clr>
+            <a:srgbClr val="A4A3A4"/>
+          </p15:clr>
+        </p15:guide>
+      </p15:sldGuideLst>
+    </p:ext>
+  </p:extLst>
 </p:presentation>
 </file>
 
 <file path=ppt/notesMasters/notesMaster1.xml><?xml version="1.0" encoding="utf-8"?>
-<p:notesMaster xmlns:a="http://schemas.openxmlformats.org/drawingml/2006/main" xmlns:r="http://schemas.openxmlformats.org/officeDocument/2006/relationships" xmlns:mc="http://schemas.openxmlformats.org/markup-compatibility/2006" xmlns:mv="urn:schemas-microsoft-com:mac:vml" xmlns:p="http://schemas.openxmlformats.org/presentationml/2006/main" mc:Ignorable="mv" mc:PreserveAttributes="mv:*">
+<p:notesMaster xmlns:a="http://schemas.openxmlformats.org/drawingml/2006/main" xmlns:r="http://schemas.openxmlformats.org/officeDocument/2006/relationships" xmlns:p="http://schemas.openxmlformats.org/presentationml/2006/main">
   <p:cSld>
     <p:bg>
       <p:bgRef idx="1001">
@@ -228,7 +244,7 @@
             <a:fld id="{CA891D5B-3442-0646-847C-26CBA6745B34}" type="datetimeFigureOut">
               <a:rPr lang="en-US" smtClean="0"/>
               <a:pPr/>
-              <a:t>1/27/12</a:t>
+              <a:t>9/18/17</a:t>
             </a:fld>
             <a:endParaRPr lang="en-US"/>
           </a:p>
@@ -495,7 +511,7 @@
 </file>
 
 <file path=ppt/notesSlides/notesSlide1.xml><?xml version="1.0" encoding="utf-8"?>
-<p:notes xmlns:a="http://schemas.openxmlformats.org/drawingml/2006/main" xmlns:r="http://schemas.openxmlformats.org/officeDocument/2006/relationships" xmlns:mc="http://schemas.openxmlformats.org/markup-compatibility/2006" xmlns:mv="urn:schemas-microsoft-com:mac:vml" xmlns:p="http://schemas.openxmlformats.org/presentationml/2006/main" mc:Ignorable="mv" mc:PreserveAttributes="mv:*">
+<p:notes xmlns:a="http://schemas.openxmlformats.org/drawingml/2006/main" xmlns:r="http://schemas.openxmlformats.org/officeDocument/2006/relationships" xmlns:p="http://schemas.openxmlformats.org/presentationml/2006/main">
   <p:cSld>
     <p:spTree>
       <p:nvGrpSpPr>
@@ -585,7 +601,7 @@
 </file>
 
 <file path=ppt/notesSlides/notesSlide2.xml><?xml version="1.0" encoding="utf-8"?>
-<p:notes xmlns:a="http://schemas.openxmlformats.org/drawingml/2006/main" xmlns:r="http://schemas.openxmlformats.org/officeDocument/2006/relationships" xmlns:mc="http://schemas.openxmlformats.org/markup-compatibility/2006" xmlns:mv="urn:schemas-microsoft-com:mac:vml" xmlns:p="http://schemas.openxmlformats.org/presentationml/2006/main" mc:Ignorable="mv" mc:PreserveAttributes="mv:*">
+<p:notes xmlns:a="http://schemas.openxmlformats.org/drawingml/2006/main" xmlns:r="http://schemas.openxmlformats.org/officeDocument/2006/relationships" xmlns:p="http://schemas.openxmlformats.org/presentationml/2006/main">
   <p:cSld>
     <p:spTree>
       <p:nvGrpSpPr>
@@ -675,7 +691,7 @@
 </file>
 
 <file path=ppt/notesSlides/notesSlide3.xml><?xml version="1.0" encoding="utf-8"?>
-<p:notes xmlns:a="http://schemas.openxmlformats.org/drawingml/2006/main" xmlns:r="http://schemas.openxmlformats.org/officeDocument/2006/relationships" xmlns:mc="http://schemas.openxmlformats.org/markup-compatibility/2006" xmlns:mv="urn:schemas-microsoft-com:mac:vml" xmlns:p="http://schemas.openxmlformats.org/presentationml/2006/main" mc:Ignorable="mv" mc:PreserveAttributes="mv:*">
+<p:notes xmlns:a="http://schemas.openxmlformats.org/drawingml/2006/main" xmlns:r="http://schemas.openxmlformats.org/officeDocument/2006/relationships" xmlns:p="http://schemas.openxmlformats.org/presentationml/2006/main">
   <p:cSld>
     <p:spTree>
       <p:nvGrpSpPr>
@@ -773,7 +789,7 @@
 </file>
 
 <file path=ppt/notesSlides/notesSlide4.xml><?xml version="1.0" encoding="utf-8"?>
-<p:notes xmlns:a="http://schemas.openxmlformats.org/drawingml/2006/main" xmlns:r="http://schemas.openxmlformats.org/officeDocument/2006/relationships" xmlns:mc="http://schemas.openxmlformats.org/markup-compatibility/2006" xmlns:mv="urn:schemas-microsoft-com:mac:vml" xmlns:p="http://schemas.openxmlformats.org/presentationml/2006/main" mc:Ignorable="mv" mc:PreserveAttributes="mv:*">
+<p:notes xmlns:a="http://schemas.openxmlformats.org/drawingml/2006/main" xmlns:r="http://schemas.openxmlformats.org/officeDocument/2006/relationships" xmlns:p="http://schemas.openxmlformats.org/presentationml/2006/main">
   <p:cSld>
     <p:spTree>
       <p:nvGrpSpPr>
@@ -859,7 +875,7 @@
 </file>
 
 <file path=ppt/notesSlides/notesSlide5.xml><?xml version="1.0" encoding="utf-8"?>
-<p:notes xmlns:a="http://schemas.openxmlformats.org/drawingml/2006/main" xmlns:r="http://schemas.openxmlformats.org/officeDocument/2006/relationships" xmlns:mc="http://schemas.openxmlformats.org/markup-compatibility/2006" xmlns:mv="urn:schemas-microsoft-com:mac:vml" xmlns:p="http://schemas.openxmlformats.org/presentationml/2006/main" mc:Ignorable="mv" mc:PreserveAttributes="mv:*">
+<p:notes xmlns:a="http://schemas.openxmlformats.org/drawingml/2006/main" xmlns:r="http://schemas.openxmlformats.org/officeDocument/2006/relationships" xmlns:p="http://schemas.openxmlformats.org/presentationml/2006/main">
   <p:cSld>
     <p:spTree>
       <p:nvGrpSpPr>
@@ -953,7 +969,7 @@
 </file>
 
 <file path=ppt/notesSlides/notesSlide6.xml><?xml version="1.0" encoding="utf-8"?>
-<p:notes xmlns:a="http://schemas.openxmlformats.org/drawingml/2006/main" xmlns:r="http://schemas.openxmlformats.org/officeDocument/2006/relationships" xmlns:mc="http://schemas.openxmlformats.org/markup-compatibility/2006" xmlns:mv="urn:schemas-microsoft-com:mac:vml" xmlns:p="http://schemas.openxmlformats.org/presentationml/2006/main" mc:Ignorable="mv" mc:PreserveAttributes="mv:*">
+<p:notes xmlns:a="http://schemas.openxmlformats.org/drawingml/2006/main" xmlns:r="http://schemas.openxmlformats.org/officeDocument/2006/relationships" xmlns:p="http://schemas.openxmlformats.org/presentationml/2006/main">
   <p:cSld>
     <p:spTree>
       <p:nvGrpSpPr>
@@ -1039,7 +1055,7 @@
 </file>
 
 <file path=ppt/notesSlides/notesSlide7.xml><?xml version="1.0" encoding="utf-8"?>
-<p:notes xmlns:a="http://schemas.openxmlformats.org/drawingml/2006/main" xmlns:r="http://schemas.openxmlformats.org/officeDocument/2006/relationships" xmlns:mc="http://schemas.openxmlformats.org/markup-compatibility/2006" xmlns:mv="urn:schemas-microsoft-com:mac:vml" xmlns:p="http://schemas.openxmlformats.org/presentationml/2006/main" mc:Ignorable="mv" mc:PreserveAttributes="mv:*">
+<p:notes xmlns:a="http://schemas.openxmlformats.org/drawingml/2006/main" xmlns:r="http://schemas.openxmlformats.org/officeDocument/2006/relationships" xmlns:p="http://schemas.openxmlformats.org/presentationml/2006/main">
   <p:cSld>
     <p:spTree>
       <p:nvGrpSpPr>
@@ -1137,7 +1153,7 @@
 </file>
 
 <file path=ppt/notesSlides/notesSlide8.xml><?xml version="1.0" encoding="utf-8"?>
-<p:notes xmlns:a="http://schemas.openxmlformats.org/drawingml/2006/main" xmlns:r="http://schemas.openxmlformats.org/officeDocument/2006/relationships" xmlns:mc="http://schemas.openxmlformats.org/markup-compatibility/2006" xmlns:mv="urn:schemas-microsoft-com:mac:vml" xmlns:p="http://schemas.openxmlformats.org/presentationml/2006/main" mc:Ignorable="mv" mc:PreserveAttributes="mv:*">
+<p:notes xmlns:a="http://schemas.openxmlformats.org/drawingml/2006/main" xmlns:r="http://schemas.openxmlformats.org/officeDocument/2006/relationships" xmlns:p="http://schemas.openxmlformats.org/presentationml/2006/main">
   <p:cSld>
     <p:spTree>
       <p:nvGrpSpPr>
@@ -1235,7 +1251,7 @@
 </file>
 
 <file path=ppt/notesSlides/notesSlide9.xml><?xml version="1.0" encoding="utf-8"?>
-<p:notes xmlns:a="http://schemas.openxmlformats.org/drawingml/2006/main" xmlns:r="http://schemas.openxmlformats.org/officeDocument/2006/relationships" xmlns:mc="http://schemas.openxmlformats.org/markup-compatibility/2006" xmlns:mv="urn:schemas-microsoft-com:mac:vml" xmlns:p="http://schemas.openxmlformats.org/presentationml/2006/main" mc:Ignorable="mv" mc:PreserveAttributes="mv:*">
+<p:notes xmlns:a="http://schemas.openxmlformats.org/drawingml/2006/main" xmlns:r="http://schemas.openxmlformats.org/officeDocument/2006/relationships" xmlns:p="http://schemas.openxmlformats.org/presentationml/2006/main">
   <p:cSld>
     <p:spTree>
       <p:nvGrpSpPr>
@@ -1329,7 +1345,7 @@
 </file>
 
 <file path=ppt/slideLayouts/slideLayout1.xml><?xml version="1.0" encoding="utf-8"?>
-<p:sldLayout xmlns:a="http://schemas.openxmlformats.org/drawingml/2006/main" xmlns:r="http://schemas.openxmlformats.org/officeDocument/2006/relationships" xmlns:mc="http://schemas.openxmlformats.org/markup-compatibility/2006" xmlns:mv="urn:schemas-microsoft-com:mac:vml" xmlns:p="http://schemas.openxmlformats.org/presentationml/2006/main" mc:Ignorable="mv" mc:PreserveAttributes="mv:*" showMasterSp="0" type="title" preserve="1">
+<p:sldLayout xmlns:a="http://schemas.openxmlformats.org/drawingml/2006/main" xmlns:r="http://schemas.openxmlformats.org/officeDocument/2006/relationships" xmlns:p="http://schemas.openxmlformats.org/presentationml/2006/main" showMasterSp="0" type="title" preserve="1">
   <p:cSld name="Title Slide">
     <p:spTree>
       <p:nvGrpSpPr>
@@ -1530,7 +1546,7 @@
             <a:fld id="{FFB4253A-06D4-BE4F-A464-031908D4BFA1}" type="datetimeFigureOut">
               <a:rPr lang="en-US" smtClean="0"/>
               <a:pPr/>
-              <a:t>1/27/12</a:t>
+              <a:t>9/18/17</a:t>
             </a:fld>
             <a:endParaRPr lang="en-US"/>
           </a:p>
@@ -1846,7 +1862,7 @@
 </file>
 
 <file path=ppt/slideLayouts/slideLayout10.xml><?xml version="1.0" encoding="utf-8"?>
-<p:sldLayout xmlns:a="http://schemas.openxmlformats.org/drawingml/2006/main" xmlns:r="http://schemas.openxmlformats.org/officeDocument/2006/relationships" xmlns:mc="http://schemas.openxmlformats.org/markup-compatibility/2006" xmlns:mv="urn:schemas-microsoft-com:mac:vml" xmlns:p="http://schemas.openxmlformats.org/presentationml/2006/main" mc:Ignorable="mv" mc:PreserveAttributes="mv:*" preserve="1">
+<p:sldLayout xmlns:a="http://schemas.openxmlformats.org/drawingml/2006/main" xmlns:r="http://schemas.openxmlformats.org/officeDocument/2006/relationships" xmlns:p="http://schemas.openxmlformats.org/presentationml/2006/main" preserve="1">
   <p:cSld name="4 Content">
     <p:spTree>
       <p:nvGrpSpPr>
@@ -1985,7 +2001,7 @@
             <a:fld id="{FFB4253A-06D4-BE4F-A464-031908D4BFA1}" type="datetimeFigureOut">
               <a:rPr lang="en-US" smtClean="0"/>
               <a:pPr/>
-              <a:t>1/27/12</a:t>
+              <a:t>9/18/17</a:t>
             </a:fld>
             <a:endParaRPr lang="en-US"/>
           </a:p>
@@ -2391,7 +2407,7 @@
 </file>
 
 <file path=ppt/slideLayouts/slideLayout11.xml><?xml version="1.0" encoding="utf-8"?>
-<p:sldLayout xmlns:a="http://schemas.openxmlformats.org/drawingml/2006/main" xmlns:r="http://schemas.openxmlformats.org/officeDocument/2006/relationships" xmlns:mc="http://schemas.openxmlformats.org/markup-compatibility/2006" xmlns:mv="urn:schemas-microsoft-com:mac:vml" xmlns:p="http://schemas.openxmlformats.org/presentationml/2006/main" mc:Ignorable="mv" mc:PreserveAttributes="mv:*" preserve="1">
+<p:sldLayout xmlns:a="http://schemas.openxmlformats.org/drawingml/2006/main" xmlns:r="http://schemas.openxmlformats.org/officeDocument/2006/relationships" xmlns:p="http://schemas.openxmlformats.org/presentationml/2006/main" preserve="1">
   <p:cSld name="Title Only">
     <p:spTree>
       <p:nvGrpSpPr>
@@ -2530,7 +2546,7 @@
             <a:fld id="{FFB4253A-06D4-BE4F-A464-031908D4BFA1}" type="datetimeFigureOut">
               <a:rPr lang="en-US" smtClean="0"/>
               <a:pPr/>
-              <a:t>1/27/12</a:t>
+              <a:t>9/18/17</a:t>
             </a:fld>
             <a:endParaRPr lang="en-US"/>
           </a:p>
@@ -2588,7 +2604,7 @@
 </file>
 
 <file path=ppt/slideLayouts/slideLayout12.xml><?xml version="1.0" encoding="utf-8"?>
-<p:sldLayout xmlns:a="http://schemas.openxmlformats.org/drawingml/2006/main" xmlns:r="http://schemas.openxmlformats.org/officeDocument/2006/relationships" xmlns:mc="http://schemas.openxmlformats.org/markup-compatibility/2006" xmlns:mv="urn:schemas-microsoft-com:mac:vml" xmlns:p="http://schemas.openxmlformats.org/presentationml/2006/main" mc:Ignorable="mv" mc:PreserveAttributes="mv:*" preserve="1">
+<p:sldLayout xmlns:a="http://schemas.openxmlformats.org/drawingml/2006/main" xmlns:r="http://schemas.openxmlformats.org/officeDocument/2006/relationships" xmlns:p="http://schemas.openxmlformats.org/presentationml/2006/main" preserve="1">
   <p:cSld name="Blank">
     <p:spTree>
       <p:nvGrpSpPr>
@@ -2668,7 +2684,7 @@
             <a:fld id="{FFB4253A-06D4-BE4F-A464-031908D4BFA1}" type="datetimeFigureOut">
               <a:rPr lang="en-US" smtClean="0"/>
               <a:pPr/>
-              <a:t>1/27/12</a:t>
+              <a:t>9/18/17</a:t>
             </a:fld>
             <a:endParaRPr lang="en-US"/>
           </a:p>
@@ -2726,7 +2742,7 @@
 </file>
 
 <file path=ppt/slideLayouts/slideLayout13.xml><?xml version="1.0" encoding="utf-8"?>
-<p:sldLayout xmlns:a="http://schemas.openxmlformats.org/drawingml/2006/main" xmlns:r="http://schemas.openxmlformats.org/officeDocument/2006/relationships" xmlns:mc="http://schemas.openxmlformats.org/markup-compatibility/2006" xmlns:mv="urn:schemas-microsoft-com:mac:vml" xmlns:p="http://schemas.openxmlformats.org/presentationml/2006/main" mc:Ignorable="mv" mc:PreserveAttributes="mv:*" type="objTx" preserve="1">
+<p:sldLayout xmlns:a="http://schemas.openxmlformats.org/drawingml/2006/main" xmlns:r="http://schemas.openxmlformats.org/officeDocument/2006/relationships" xmlns:p="http://schemas.openxmlformats.org/presentationml/2006/main" type="objTx" preserve="1">
   <p:cSld name="Content with Caption">
     <p:spTree>
       <p:nvGrpSpPr>
@@ -3005,7 +3021,7 @@
             <a:fld id="{FFB4253A-06D4-BE4F-A464-031908D4BFA1}" type="datetimeFigureOut">
               <a:rPr lang="en-US" smtClean="0"/>
               <a:pPr/>
-              <a:t>1/27/12</a:t>
+              <a:t>9/18/17</a:t>
             </a:fld>
             <a:endParaRPr lang="en-US"/>
           </a:p>
@@ -3080,7 +3096,7 @@
 </file>
 
 <file path=ppt/slideLayouts/slideLayout14.xml><?xml version="1.0" encoding="utf-8"?>
-<p:sldLayout xmlns:a="http://schemas.openxmlformats.org/drawingml/2006/main" xmlns:r="http://schemas.openxmlformats.org/officeDocument/2006/relationships" xmlns:mc="http://schemas.openxmlformats.org/markup-compatibility/2006" xmlns:mv="urn:schemas-microsoft-com:mac:vml" xmlns:p="http://schemas.openxmlformats.org/presentationml/2006/main" mc:Ignorable="mv" mc:PreserveAttributes="mv:*" type="picTx" preserve="1">
+<p:sldLayout xmlns:a="http://schemas.openxmlformats.org/drawingml/2006/main" xmlns:r="http://schemas.openxmlformats.org/officeDocument/2006/relationships" xmlns:p="http://schemas.openxmlformats.org/presentationml/2006/main" type="picTx" preserve="1">
   <p:cSld name="Picture with Caption">
     <p:spTree>
       <p:nvGrpSpPr>
@@ -3329,7 +3345,7 @@
             <a:fld id="{FFB4253A-06D4-BE4F-A464-031908D4BFA1}" type="datetimeFigureOut">
               <a:rPr lang="en-US" smtClean="0"/>
               <a:pPr/>
-              <a:t>1/27/12</a:t>
+              <a:t>9/18/17</a:t>
             </a:fld>
             <a:endParaRPr lang="en-US"/>
           </a:p>
@@ -3428,7 +3444,7 @@
 </file>
 
 <file path=ppt/slideLayouts/slideLayout15.xml><?xml version="1.0" encoding="utf-8"?>
-<p:sldLayout xmlns:a="http://schemas.openxmlformats.org/drawingml/2006/main" xmlns:r="http://schemas.openxmlformats.org/officeDocument/2006/relationships" xmlns:mc="http://schemas.openxmlformats.org/markup-compatibility/2006" xmlns:mv="urn:schemas-microsoft-com:mac:vml" xmlns:p="http://schemas.openxmlformats.org/presentationml/2006/main" mc:Ignorable="mv" mc:PreserveAttributes="mv:*" type="picTx" preserve="1">
+<p:sldLayout xmlns:a="http://schemas.openxmlformats.org/drawingml/2006/main" xmlns:r="http://schemas.openxmlformats.org/officeDocument/2006/relationships" xmlns:p="http://schemas.openxmlformats.org/presentationml/2006/main" type="picTx" preserve="1">
   <p:cSld name="Picture above Caption">
     <p:spTree>
       <p:nvGrpSpPr>
@@ -3629,7 +3645,7 @@
             <a:fld id="{FFB4253A-06D4-BE4F-A464-031908D4BFA1}" type="datetimeFigureOut">
               <a:rPr lang="en-US" smtClean="0"/>
               <a:pPr/>
-              <a:t>1/27/12</a:t>
+              <a:t>9/18/17</a:t>
             </a:fld>
             <a:endParaRPr lang="en-US"/>
           </a:p>
@@ -3815,7 +3831,7 @@
 </file>
 
 <file path=ppt/slideLayouts/slideLayout16.xml><?xml version="1.0" encoding="utf-8"?>
-<p:sldLayout xmlns:a="http://schemas.openxmlformats.org/drawingml/2006/main" xmlns:r="http://schemas.openxmlformats.org/officeDocument/2006/relationships" xmlns:mc="http://schemas.openxmlformats.org/markup-compatibility/2006" xmlns:mv="urn:schemas-microsoft-com:mac:vml" xmlns:p="http://schemas.openxmlformats.org/presentationml/2006/main" mc:Ignorable="mv" mc:PreserveAttributes="mv:*" preserve="1">
+<p:sldLayout xmlns:a="http://schemas.openxmlformats.org/drawingml/2006/main" xmlns:r="http://schemas.openxmlformats.org/officeDocument/2006/relationships" xmlns:p="http://schemas.openxmlformats.org/presentationml/2006/main" preserve="1">
   <p:cSld name="2 Pictures with Caption">
     <p:spTree>
       <p:nvGrpSpPr>
@@ -4015,7 +4031,7 @@
             <a:fld id="{FFB4253A-06D4-BE4F-A464-031908D4BFA1}" type="datetimeFigureOut">
               <a:rPr lang="en-US" smtClean="0"/>
               <a:pPr/>
-              <a:t>1/27/12</a:t>
+              <a:t>9/18/17</a:t>
             </a:fld>
             <a:endParaRPr lang="en-US"/>
           </a:p>
@@ -4234,7 +4250,7 @@
 </file>
 
 <file path=ppt/slideLayouts/slideLayout17.xml><?xml version="1.0" encoding="utf-8"?>
-<p:sldLayout xmlns:a="http://schemas.openxmlformats.org/drawingml/2006/main" xmlns:r="http://schemas.openxmlformats.org/officeDocument/2006/relationships" xmlns:mc="http://schemas.openxmlformats.org/markup-compatibility/2006" xmlns:mv="urn:schemas-microsoft-com:mac:vml" xmlns:p="http://schemas.openxmlformats.org/presentationml/2006/main" mc:Ignorable="mv" mc:PreserveAttributes="mv:*" preserve="1">
+<p:sldLayout xmlns:a="http://schemas.openxmlformats.org/drawingml/2006/main" xmlns:r="http://schemas.openxmlformats.org/officeDocument/2006/relationships" xmlns:p="http://schemas.openxmlformats.org/presentationml/2006/main" preserve="1">
   <p:cSld name="3 Pictures with Caption">
     <p:spTree>
       <p:nvGrpSpPr>
@@ -4434,7 +4450,7 @@
             <a:fld id="{FFB4253A-06D4-BE4F-A464-031908D4BFA1}" type="datetimeFigureOut">
               <a:rPr lang="en-US" smtClean="0"/>
               <a:pPr/>
-              <a:t>1/27/12</a:t>
+              <a:t>9/18/17</a:t>
             </a:fld>
             <a:endParaRPr lang="en-US"/>
           </a:p>
@@ -4732,7 +4748,7 @@
 </file>
 
 <file path=ppt/slideLayouts/slideLayout18.xml><?xml version="1.0" encoding="utf-8"?>
-<p:sldLayout xmlns:a="http://schemas.openxmlformats.org/drawingml/2006/main" xmlns:r="http://schemas.openxmlformats.org/officeDocument/2006/relationships" xmlns:mc="http://schemas.openxmlformats.org/markup-compatibility/2006" xmlns:mv="urn:schemas-microsoft-com:mac:vml" xmlns:p="http://schemas.openxmlformats.org/presentationml/2006/main" mc:Ignorable="mv" mc:PreserveAttributes="mv:*" preserve="1">
+<p:sldLayout xmlns:a="http://schemas.openxmlformats.org/drawingml/2006/main" xmlns:r="http://schemas.openxmlformats.org/officeDocument/2006/relationships" xmlns:p="http://schemas.openxmlformats.org/presentationml/2006/main" preserve="1">
   <p:cSld name="3 Pictures with Caption, Alt.">
     <p:spTree>
       <p:nvGrpSpPr>
@@ -4981,7 +4997,7 @@
             <a:fld id="{FFB4253A-06D4-BE4F-A464-031908D4BFA1}" type="datetimeFigureOut">
               <a:rPr lang="en-US" smtClean="0"/>
               <a:pPr/>
-              <a:t>1/27/12</a:t>
+              <a:t>9/18/17</a:t>
             </a:fld>
             <a:endParaRPr lang="en-US"/>
           </a:p>
@@ -5146,7 +5162,7 @@
 </file>
 
 <file path=ppt/slideLayouts/slideLayout19.xml><?xml version="1.0" encoding="utf-8"?>
-<p:sldLayout xmlns:a="http://schemas.openxmlformats.org/drawingml/2006/main" xmlns:r="http://schemas.openxmlformats.org/officeDocument/2006/relationships" xmlns:mc="http://schemas.openxmlformats.org/markup-compatibility/2006" xmlns:mv="urn:schemas-microsoft-com:mac:vml" xmlns:p="http://schemas.openxmlformats.org/presentationml/2006/main" mc:Ignorable="mv" mc:PreserveAttributes="mv:*" preserve="1">
+<p:sldLayout xmlns:a="http://schemas.openxmlformats.org/drawingml/2006/main" xmlns:r="http://schemas.openxmlformats.org/officeDocument/2006/relationships" xmlns:p="http://schemas.openxmlformats.org/presentationml/2006/main" preserve="1">
   <p:cSld name="Title and Vertical Text">
     <p:spTree>
       <p:nvGrpSpPr>
@@ -5337,7 +5353,7 @@
             <a:fld id="{FFB4253A-06D4-BE4F-A464-031908D4BFA1}" type="datetimeFigureOut">
               <a:rPr lang="en-US" smtClean="0"/>
               <a:pPr/>
-              <a:t>1/27/12</a:t>
+              <a:t>9/18/17</a:t>
             </a:fld>
             <a:endParaRPr lang="en-US"/>
           </a:p>
@@ -5395,7 +5411,7 @@
 </file>
 
 <file path=ppt/slideLayouts/slideLayout2.xml><?xml version="1.0" encoding="utf-8"?>
-<p:sldLayout xmlns:a="http://schemas.openxmlformats.org/drawingml/2006/main" xmlns:r="http://schemas.openxmlformats.org/officeDocument/2006/relationships" xmlns:mc="http://schemas.openxmlformats.org/markup-compatibility/2006" xmlns:mv="urn:schemas-microsoft-com:mac:vml" xmlns:p="http://schemas.openxmlformats.org/presentationml/2006/main" mc:Ignorable="mv" mc:PreserveAttributes="mv:*" preserve="1">
+<p:sldLayout xmlns:a="http://schemas.openxmlformats.org/drawingml/2006/main" xmlns:r="http://schemas.openxmlformats.org/officeDocument/2006/relationships" xmlns:p="http://schemas.openxmlformats.org/presentationml/2006/main" preserve="1">
   <p:cSld name="Title and Content">
     <p:spTree>
       <p:nvGrpSpPr>
@@ -5550,7 +5566,7 @@
             <a:fld id="{FFB4253A-06D4-BE4F-A464-031908D4BFA1}" type="datetimeFigureOut">
               <a:rPr lang="en-US" smtClean="0"/>
               <a:pPr/>
-              <a:t>1/27/12</a:t>
+              <a:t>9/18/17</a:t>
             </a:fld>
             <a:endParaRPr lang="en-US"/>
           </a:p>
@@ -5690,7 +5706,7 @@
 </file>
 
 <file path=ppt/slideLayouts/slideLayout20.xml><?xml version="1.0" encoding="utf-8"?>
-<p:sldLayout xmlns:a="http://schemas.openxmlformats.org/drawingml/2006/main" xmlns:r="http://schemas.openxmlformats.org/officeDocument/2006/relationships" xmlns:mc="http://schemas.openxmlformats.org/markup-compatibility/2006" xmlns:mv="urn:schemas-microsoft-com:mac:vml" xmlns:p="http://schemas.openxmlformats.org/presentationml/2006/main" mc:Ignorable="mv" mc:PreserveAttributes="mv:*" preserve="1">
+<p:sldLayout xmlns:a="http://schemas.openxmlformats.org/drawingml/2006/main" xmlns:r="http://schemas.openxmlformats.org/officeDocument/2006/relationships" xmlns:p="http://schemas.openxmlformats.org/presentationml/2006/main" preserve="1">
   <p:cSld name="Vertical Title and Text">
     <p:spTree>
       <p:nvGrpSpPr>
@@ -5855,7 +5871,7 @@
             <a:fld id="{FFB4253A-06D4-BE4F-A464-031908D4BFA1}" type="datetimeFigureOut">
               <a:rPr lang="en-US" smtClean="0"/>
               <a:pPr/>
-              <a:t>1/27/12</a:t>
+              <a:t>9/18/17</a:t>
             </a:fld>
             <a:endParaRPr lang="en-US"/>
           </a:p>
@@ -5949,7 +5965,7 @@
 </file>
 
 <file path=ppt/slideLayouts/slideLayout3.xml><?xml version="1.0" encoding="utf-8"?>
-<p:sldLayout xmlns:a="http://schemas.openxmlformats.org/drawingml/2006/main" xmlns:r="http://schemas.openxmlformats.org/officeDocument/2006/relationships" xmlns:mc="http://schemas.openxmlformats.org/markup-compatibility/2006" xmlns:mv="urn:schemas-microsoft-com:mac:vml" xmlns:p="http://schemas.openxmlformats.org/presentationml/2006/main" mc:Ignorable="mv" mc:PreserveAttributes="mv:*" preserve="1">
+<p:sldLayout xmlns:a="http://schemas.openxmlformats.org/drawingml/2006/main" xmlns:r="http://schemas.openxmlformats.org/officeDocument/2006/relationships" xmlns:p="http://schemas.openxmlformats.org/presentationml/2006/main" preserve="1">
   <p:cSld name="Title and Content, Alt.">
     <p:spTree>
       <p:nvGrpSpPr>
@@ -6109,7 +6125,7 @@
             <a:fld id="{FFB4253A-06D4-BE4F-A464-031908D4BFA1}" type="datetimeFigureOut">
               <a:rPr lang="en-US" smtClean="0"/>
               <a:pPr/>
-              <a:t>1/27/12</a:t>
+              <a:t>9/18/17</a:t>
             </a:fld>
             <a:endParaRPr lang="en-US"/>
           </a:p>
@@ -6299,7 +6315,7 @@
 </file>
 
 <file path=ppt/slideLayouts/slideLayout4.xml><?xml version="1.0" encoding="utf-8"?>
-<p:sldLayout xmlns:a="http://schemas.openxmlformats.org/drawingml/2006/main" xmlns:r="http://schemas.openxmlformats.org/officeDocument/2006/relationships" xmlns:mc="http://schemas.openxmlformats.org/markup-compatibility/2006" xmlns:mv="urn:schemas-microsoft-com:mac:vml" xmlns:p="http://schemas.openxmlformats.org/presentationml/2006/main" mc:Ignorable="mv" mc:PreserveAttributes="mv:*" preserve="1">
+<p:sldLayout xmlns:a="http://schemas.openxmlformats.org/drawingml/2006/main" xmlns:r="http://schemas.openxmlformats.org/officeDocument/2006/relationships" xmlns:p="http://schemas.openxmlformats.org/presentationml/2006/main" preserve="1">
   <p:cSld name="Title Slide with 2 Pictures">
     <p:spTree>
       <p:nvGrpSpPr>
@@ -6500,7 +6516,7 @@
             <a:fld id="{FFB4253A-06D4-BE4F-A464-031908D4BFA1}" type="datetimeFigureOut">
               <a:rPr lang="en-US" smtClean="0"/>
               <a:pPr/>
-              <a:t>1/27/12</a:t>
+              <a:t>9/18/17</a:t>
             </a:fld>
             <a:endParaRPr lang="en-US"/>
           </a:p>
@@ -6834,7 +6850,7 @@
 </file>
 
 <file path=ppt/slideLayouts/slideLayout5.xml><?xml version="1.0" encoding="utf-8"?>
-<p:sldLayout xmlns:a="http://schemas.openxmlformats.org/drawingml/2006/main" xmlns:r="http://schemas.openxmlformats.org/officeDocument/2006/relationships" xmlns:mc="http://schemas.openxmlformats.org/markup-compatibility/2006" xmlns:mv="urn:schemas-microsoft-com:mac:vml" xmlns:p="http://schemas.openxmlformats.org/presentationml/2006/main" mc:Ignorable="mv" mc:PreserveAttributes="mv:*" type="secHead" preserve="1">
+<p:sldLayout xmlns:a="http://schemas.openxmlformats.org/drawingml/2006/main" xmlns:r="http://schemas.openxmlformats.org/officeDocument/2006/relationships" xmlns:p="http://schemas.openxmlformats.org/presentationml/2006/main" type="secHead" preserve="1">
   <p:cSld name="Section Header">
     <p:spTree>
       <p:nvGrpSpPr>
@@ -7087,7 +7103,7 @@
             <a:fld id="{FFB4253A-06D4-BE4F-A464-031908D4BFA1}" type="datetimeFigureOut">
               <a:rPr lang="en-US" smtClean="0"/>
               <a:pPr/>
-              <a:t>1/27/12</a:t>
+              <a:t>9/18/17</a:t>
             </a:fld>
             <a:endParaRPr lang="en-US"/>
           </a:p>
@@ -7245,7 +7261,7 @@
 </file>
 
 <file path=ppt/slideLayouts/slideLayout6.xml><?xml version="1.0" encoding="utf-8"?>
-<p:sldLayout xmlns:a="http://schemas.openxmlformats.org/drawingml/2006/main" xmlns:r="http://schemas.openxmlformats.org/officeDocument/2006/relationships" xmlns:mc="http://schemas.openxmlformats.org/markup-compatibility/2006" xmlns:mv="urn:schemas-microsoft-com:mac:vml" xmlns:p="http://schemas.openxmlformats.org/presentationml/2006/main" mc:Ignorable="mv" mc:PreserveAttributes="mv:*" preserve="1">
+<p:sldLayout xmlns:a="http://schemas.openxmlformats.org/drawingml/2006/main" xmlns:r="http://schemas.openxmlformats.org/officeDocument/2006/relationships" xmlns:p="http://schemas.openxmlformats.org/presentationml/2006/main" preserve="1">
   <p:cSld name="Two Content">
     <p:spTree>
       <p:nvGrpSpPr>
@@ -7604,7 +7620,7 @@
             <a:fld id="{FFB4253A-06D4-BE4F-A464-031908D4BFA1}" type="datetimeFigureOut">
               <a:rPr lang="en-US" smtClean="0"/>
               <a:pPr/>
-              <a:t>1/27/12</a:t>
+              <a:t>9/18/17</a:t>
             </a:fld>
             <a:endParaRPr lang="en-US"/>
           </a:p>
@@ -7662,7 +7678,7 @@
 </file>
 
 <file path=ppt/slideLayouts/slideLayout7.xml><?xml version="1.0" encoding="utf-8"?>
-<p:sldLayout xmlns:a="http://schemas.openxmlformats.org/drawingml/2006/main" xmlns:r="http://schemas.openxmlformats.org/officeDocument/2006/relationships" xmlns:mc="http://schemas.openxmlformats.org/markup-compatibility/2006" xmlns:mv="urn:schemas-microsoft-com:mac:vml" xmlns:p="http://schemas.openxmlformats.org/presentationml/2006/main" mc:Ignorable="mv" mc:PreserveAttributes="mv:*" preserve="1">
+<p:sldLayout xmlns:a="http://schemas.openxmlformats.org/drawingml/2006/main" xmlns:r="http://schemas.openxmlformats.org/officeDocument/2006/relationships" xmlns:p="http://schemas.openxmlformats.org/presentationml/2006/main" preserve="1">
   <p:cSld name="Comparison">
     <p:spTree>
       <p:nvGrpSpPr>
@@ -7979,7 +7995,7 @@
             <a:fld id="{FFB4253A-06D4-BE4F-A464-031908D4BFA1}" type="datetimeFigureOut">
               <a:rPr lang="en-US" smtClean="0"/>
               <a:pPr/>
-              <a:t>1/27/12</a:t>
+              <a:t>9/18/17</a:t>
             </a:fld>
             <a:endParaRPr lang="en-US"/>
           </a:p>
@@ -8200,7 +8216,7 @@
 </file>
 
 <file path=ppt/slideLayouts/slideLayout8.xml><?xml version="1.0" encoding="utf-8"?>
-<p:sldLayout xmlns:a="http://schemas.openxmlformats.org/drawingml/2006/main" xmlns:r="http://schemas.openxmlformats.org/officeDocument/2006/relationships" xmlns:mc="http://schemas.openxmlformats.org/markup-compatibility/2006" xmlns:mv="urn:schemas-microsoft-com:mac:vml" xmlns:p="http://schemas.openxmlformats.org/presentationml/2006/main" mc:Ignorable="mv" mc:PreserveAttributes="mv:*" preserve="1">
+<p:sldLayout xmlns:a="http://schemas.openxmlformats.org/drawingml/2006/main" xmlns:r="http://schemas.openxmlformats.org/officeDocument/2006/relationships" xmlns:p="http://schemas.openxmlformats.org/presentationml/2006/main" preserve="1">
   <p:cSld name="2 Content, Top and Bottom">
     <p:spTree>
       <p:nvGrpSpPr>
@@ -8380,7 +8396,7 @@
             <a:fld id="{FFB4253A-06D4-BE4F-A464-031908D4BFA1}" type="datetimeFigureOut">
               <a:rPr lang="en-US" smtClean="0"/>
               <a:pPr/>
-              <a:t>1/27/12</a:t>
+              <a:t>9/18/17</a:t>
             </a:fld>
             <a:endParaRPr lang="en-US"/>
           </a:p>
@@ -8576,7 +8592,7 @@
 </file>
 
 <file path=ppt/slideLayouts/slideLayout9.xml><?xml version="1.0" encoding="utf-8"?>
-<p:sldLayout xmlns:a="http://schemas.openxmlformats.org/drawingml/2006/main" xmlns:r="http://schemas.openxmlformats.org/officeDocument/2006/relationships" xmlns:mc="http://schemas.openxmlformats.org/markup-compatibility/2006" xmlns:mv="urn:schemas-microsoft-com:mac:vml" xmlns:p="http://schemas.openxmlformats.org/presentationml/2006/main" mc:Ignorable="mv" mc:PreserveAttributes="mv:*" preserve="1">
+<p:sldLayout xmlns:a="http://schemas.openxmlformats.org/drawingml/2006/main" xmlns:r="http://schemas.openxmlformats.org/officeDocument/2006/relationships" xmlns:p="http://schemas.openxmlformats.org/presentationml/2006/main" preserve="1">
   <p:cSld name="3 Content">
     <p:spTree>
       <p:nvGrpSpPr>
@@ -8802,7 +8818,7 @@
             <a:fld id="{FFB4253A-06D4-BE4F-A464-031908D4BFA1}" type="datetimeFigureOut">
               <a:rPr lang="en-US" smtClean="0"/>
               <a:pPr/>
-              <a:t>1/27/12</a:t>
+              <a:t>9/18/17</a:t>
             </a:fld>
             <a:endParaRPr lang="en-US"/>
           </a:p>
@@ -9034,7 +9050,7 @@
 </file>
 
 <file path=ppt/slideMasters/slideMaster1.xml><?xml version="1.0" encoding="utf-8"?>
-<p:sldMaster xmlns:a="http://schemas.openxmlformats.org/drawingml/2006/main" xmlns:r="http://schemas.openxmlformats.org/officeDocument/2006/relationships" xmlns:mc="http://schemas.openxmlformats.org/markup-compatibility/2006" xmlns:mv="urn:schemas-microsoft-com:mac:vml" xmlns:p="http://schemas.openxmlformats.org/presentationml/2006/main" mc:Ignorable="mv" mc:PreserveAttributes="mv:*">
+<p:sldMaster xmlns:a="http://schemas.openxmlformats.org/drawingml/2006/main" xmlns:r="http://schemas.openxmlformats.org/officeDocument/2006/relationships" xmlns:p="http://schemas.openxmlformats.org/presentationml/2006/main">
   <p:cSld>
     <p:bg>
       <p:bgRef idx="1001">
@@ -9187,7 +9203,7 @@
             <a:fld id="{FFB4253A-06D4-BE4F-A464-031908D4BFA1}" type="datetimeFigureOut">
               <a:rPr lang="en-US" smtClean="0"/>
               <a:pPr/>
-              <a:t>1/27/12</a:t>
+              <a:t>9/18/17</a:t>
             </a:fld>
             <a:endParaRPr lang="en-US"/>
           </a:p>
@@ -9591,7 +9607,7 @@
 </file>
 
 <file path=ppt/slides/slide1.xml><?xml version="1.0" encoding="utf-8"?>
-<p:sld xmlns:a="http://schemas.openxmlformats.org/drawingml/2006/main" xmlns:r="http://schemas.openxmlformats.org/officeDocument/2006/relationships" xmlns:mc="http://schemas.openxmlformats.org/markup-compatibility/2006" xmlns:mv="urn:schemas-microsoft-com:mac:vml" xmlns:p="http://schemas.openxmlformats.org/presentationml/2006/main" mc:Ignorable="mv" mc:PreserveAttributes="mv:*">
+<p:sld xmlns:a="http://schemas.openxmlformats.org/drawingml/2006/main" xmlns:r="http://schemas.openxmlformats.org/officeDocument/2006/relationships" xmlns:p="http://schemas.openxmlformats.org/presentationml/2006/main">
   <p:cSld>
     <p:spTree>
       <p:nvGrpSpPr>
@@ -9695,7 +9711,7 @@
 </file>
 
 <file path=ppt/slides/slide10.xml><?xml version="1.0" encoding="utf-8"?>
-<p:sld xmlns:a="http://schemas.openxmlformats.org/drawingml/2006/main" xmlns:r="http://schemas.openxmlformats.org/officeDocument/2006/relationships" xmlns:mc="http://schemas.openxmlformats.org/markup-compatibility/2006" xmlns:mv="urn:schemas-microsoft-com:mac:vml" xmlns:p="http://schemas.openxmlformats.org/presentationml/2006/main" mc:Ignorable="mv" mc:PreserveAttributes="mv:*">
+<p:sld xmlns:a="http://schemas.openxmlformats.org/drawingml/2006/main" xmlns:r="http://schemas.openxmlformats.org/officeDocument/2006/relationships" xmlns:p="http://schemas.openxmlformats.org/presentationml/2006/main">
   <p:cSld>
     <p:spTree>
       <p:nvGrpSpPr>
@@ -10241,11 +10257,18 @@
   <p:clrMapOvr>
     <a:masterClrMapping/>
   </p:clrMapOvr>
+  <p:timing>
+    <p:tnLst>
+      <p:par>
+        <p:cTn id="1" dur="indefinite" restart="never" nodeType="tmRoot"/>
+      </p:par>
+    </p:tnLst>
+  </p:timing>
 </p:sld>
 </file>
 
 <file path=ppt/slides/slide11.xml><?xml version="1.0" encoding="utf-8"?>
-<p:sld xmlns:a="http://schemas.openxmlformats.org/drawingml/2006/main" xmlns:r="http://schemas.openxmlformats.org/officeDocument/2006/relationships" xmlns:mc="http://schemas.openxmlformats.org/markup-compatibility/2006" xmlns:mv="urn:schemas-microsoft-com:mac:vml" xmlns:p="http://schemas.openxmlformats.org/presentationml/2006/main" mc:Ignorable="mv" mc:PreserveAttributes="mv:*">
+<p:sld xmlns:a="http://schemas.openxmlformats.org/drawingml/2006/main" xmlns:r="http://schemas.openxmlformats.org/officeDocument/2006/relationships" xmlns:p="http://schemas.openxmlformats.org/presentationml/2006/main">
   <p:cSld>
     <p:spTree>
       <p:nvGrpSpPr>
@@ -10909,7 +10932,7 @@
 </file>
 
 <file path=ppt/slides/slide12.xml><?xml version="1.0" encoding="utf-8"?>
-<p:sld xmlns:a="http://schemas.openxmlformats.org/drawingml/2006/main" xmlns:r="http://schemas.openxmlformats.org/officeDocument/2006/relationships" xmlns:mc="http://schemas.openxmlformats.org/markup-compatibility/2006" xmlns:mv="urn:schemas-microsoft-com:mac:vml" xmlns:p="http://schemas.openxmlformats.org/presentationml/2006/main" mc:Ignorable="mv" mc:PreserveAttributes="mv:*">
+<p:sld xmlns:a="http://schemas.openxmlformats.org/drawingml/2006/main" xmlns:r="http://schemas.openxmlformats.org/officeDocument/2006/relationships" xmlns:p="http://schemas.openxmlformats.org/presentationml/2006/main">
   <p:cSld>
     <p:spTree>
       <p:nvGrpSpPr>
@@ -11172,7 +11195,7 @@
 </file>
 
 <file path=ppt/slides/slide13.xml><?xml version="1.0" encoding="utf-8"?>
-<p:sld xmlns:a="http://schemas.openxmlformats.org/drawingml/2006/main" xmlns:r="http://schemas.openxmlformats.org/officeDocument/2006/relationships" xmlns:mc="http://schemas.openxmlformats.org/markup-compatibility/2006" xmlns:mv="urn:schemas-microsoft-com:mac:vml" xmlns:p="http://schemas.openxmlformats.org/presentationml/2006/main" mc:Ignorable="mv" mc:PreserveAttributes="mv:*">
+<p:sld xmlns:a="http://schemas.openxmlformats.org/drawingml/2006/main" xmlns:r="http://schemas.openxmlformats.org/officeDocument/2006/relationships" xmlns:p="http://schemas.openxmlformats.org/presentationml/2006/main">
   <p:cSld>
     <p:spTree>
       <p:nvGrpSpPr>
@@ -11495,7 +11518,7 @@
 </file>
 
 <file path=ppt/slides/slide14.xml><?xml version="1.0" encoding="utf-8"?>
-<p:sld xmlns:a="http://schemas.openxmlformats.org/drawingml/2006/main" xmlns:r="http://schemas.openxmlformats.org/officeDocument/2006/relationships" xmlns:mc="http://schemas.openxmlformats.org/markup-compatibility/2006" xmlns:mv="urn:schemas-microsoft-com:mac:vml" xmlns:p="http://schemas.openxmlformats.org/presentationml/2006/main" mc:Ignorable="mv" mc:PreserveAttributes="mv:*">
+<p:sld xmlns:a="http://schemas.openxmlformats.org/drawingml/2006/main" xmlns:r="http://schemas.openxmlformats.org/officeDocument/2006/relationships" xmlns:p="http://schemas.openxmlformats.org/presentationml/2006/main">
   <p:cSld>
     <p:spTree>
       <p:nvGrpSpPr>
@@ -11574,15 +11597,7 @@
           <a:p>
             <a:r>
               <a:rPr lang="en-US" dirty="0" smtClean="0"/>
-              <a:t>OWL</a:t>
-            </a:r>
-            <a:r>
-              <a:rPr lang="en-US" dirty="0" smtClean="0"/>
-              <a:t>: object</a:t>
-            </a:r>
-            <a:r>
-              <a:rPr lang="en-US" dirty="0" smtClean="0"/>
-              <a:t>  property</a:t>
+              <a:t>OWL: object  property</a:t>
             </a:r>
             <a:endParaRPr lang="en-US" dirty="0"/>
           </a:p>
@@ -11697,11 +11712,18 @@
   <p:clrMapOvr>
     <a:masterClrMapping/>
   </p:clrMapOvr>
+  <p:timing>
+    <p:tnLst>
+      <p:par>
+        <p:cTn id="1" dur="indefinite" restart="never" nodeType="tmRoot"/>
+      </p:par>
+    </p:tnLst>
+  </p:timing>
 </p:sld>
 </file>
 
 <file path=ppt/slides/slide15.xml><?xml version="1.0" encoding="utf-8"?>
-<p:sld xmlns:a="http://schemas.openxmlformats.org/drawingml/2006/main" xmlns:r="http://schemas.openxmlformats.org/officeDocument/2006/relationships" xmlns:mc="http://schemas.openxmlformats.org/markup-compatibility/2006" xmlns:mv="urn:schemas-microsoft-com:mac:vml" xmlns:p="http://schemas.openxmlformats.org/presentationml/2006/main" mc:Ignorable="mv" mc:PreserveAttributes="mv:*">
+<p:sld xmlns:a="http://schemas.openxmlformats.org/drawingml/2006/main" xmlns:r="http://schemas.openxmlformats.org/officeDocument/2006/relationships" xmlns:p="http://schemas.openxmlformats.org/presentationml/2006/main">
   <p:cSld>
     <p:spTree>
       <p:nvGrpSpPr>
@@ -11906,7 +11928,7 @@
 </file>
 
 <file path=ppt/slides/slide16.xml><?xml version="1.0" encoding="utf-8"?>
-<p:sld xmlns:a="http://schemas.openxmlformats.org/drawingml/2006/main" xmlns:r="http://schemas.openxmlformats.org/officeDocument/2006/relationships" xmlns:mc="http://schemas.openxmlformats.org/markup-compatibility/2006" xmlns:mv="urn:schemas-microsoft-com:mac:vml" xmlns:p="http://schemas.openxmlformats.org/presentationml/2006/main" mc:Ignorable="mv" mc:PreserveAttributes="mv:*">
+<p:sld xmlns:a="http://schemas.openxmlformats.org/drawingml/2006/main" xmlns:r="http://schemas.openxmlformats.org/officeDocument/2006/relationships" xmlns:p="http://schemas.openxmlformats.org/presentationml/2006/main">
   <p:cSld>
     <p:spTree>
       <p:nvGrpSpPr>
@@ -11972,11 +11994,7 @@
             <a:pPr lvl="1"/>
             <a:r>
               <a:rPr lang="en-US" sz="2400" dirty="0" smtClean="0"/>
-              <a:t>OBO </a:t>
-            </a:r>
-            <a:r>
-              <a:rPr lang="en-US" sz="2400" dirty="0" smtClean="0"/>
-              <a:t>(</a:t>
+              <a:t>OBO (</a:t>
             </a:r>
             <a:r>
               <a:rPr lang="en-US" sz="2400" b="1" dirty="0" smtClean="0">
@@ -11999,13 +12017,8 @@
             </a:r>
             <a:r>
               <a:rPr lang="en-US" sz="2400" dirty="0" smtClean="0"/>
-              <a:t>:</a:t>
-            </a:r>
-            <a:r>
-              <a:rPr lang="en-US" sz="2400" dirty="0" smtClean="0"/>
-              <a:t> leg</a:t>
-            </a:r>
-            <a:endParaRPr lang="en-US" sz="2400" dirty="0" smtClean="0"/>
+              <a:t>: leg</a:t>
+            </a:r>
           </a:p>
           <a:p>
             <a:pPr lvl="2"/>
@@ -12038,23 +12051,14 @@
             <a:pPr lvl="1"/>
             <a:r>
               <a:rPr lang="en-US" sz="2400" dirty="0" smtClean="0"/>
-              <a:t>OWL </a:t>
-            </a:r>
+              <a:t>OWL (MS):</a:t>
+            </a:r>
+          </a:p>
+          <a:p>
+            <a:pPr lvl="2"/>
             <a:r>
               <a:rPr lang="en-US" sz="2400" dirty="0" smtClean="0"/>
-              <a:t>(MS):</a:t>
-            </a:r>
-            <a:endParaRPr lang="en-US" sz="2400" dirty="0" smtClean="0"/>
-          </a:p>
-          <a:p>
-            <a:pPr lvl="2"/>
-            <a:r>
-              <a:rPr lang="en-US" sz="2400" dirty="0" smtClean="0"/>
-              <a:t>leg</a:t>
-            </a:r>
-            <a:r>
-              <a:rPr lang="en-US" sz="2400" dirty="0" smtClean="0"/>
-              <a:t> </a:t>
+              <a:t>leg </a:t>
             </a:r>
             <a:r>
               <a:rPr lang="en-US" sz="2400" i="1" dirty="0" err="1" smtClean="0">
@@ -12089,18 +12093,7 @@
                   </a:schemeClr>
                 </a:solidFill>
               </a:rPr>
-              <a:t>some</a:t>
-            </a:r>
-            <a:r>
-              <a:rPr lang="en-US" sz="2400" i="1" dirty="0" smtClean="0">
-                <a:solidFill>
-                  <a:schemeClr val="accent2">
-                    <a:lumMod val="75000"/>
-                    <a:lumOff val="25000"/>
-                  </a:schemeClr>
-                </a:solidFill>
-              </a:rPr>
-              <a:t> ‘</a:t>
+              <a:t>some ‘</a:t>
             </a:r>
             <a:r>
               <a:rPr lang="en-US" sz="2400" dirty="0" smtClean="0"/>
@@ -12161,7 +12154,7 @@
 </file>
 
 <file path=ppt/slides/slide17.xml><?xml version="1.0" encoding="utf-8"?>
-<p:sld xmlns:a="http://schemas.openxmlformats.org/drawingml/2006/main" xmlns:r="http://schemas.openxmlformats.org/officeDocument/2006/relationships" xmlns:mc="http://schemas.openxmlformats.org/markup-compatibility/2006" xmlns:mv="urn:schemas-microsoft-com:mac:vml" xmlns:p="http://schemas.openxmlformats.org/presentationml/2006/main" mc:Ignorable="mv" mc:PreserveAttributes="mv:*">
+<p:sld xmlns:a="http://schemas.openxmlformats.org/drawingml/2006/main" xmlns:r="http://schemas.openxmlformats.org/officeDocument/2006/relationships" xmlns:p="http://schemas.openxmlformats.org/presentationml/2006/main">
   <p:cSld>
     <p:spTree>
       <p:nvGrpSpPr>
@@ -12442,11 +12435,7 @@
           <a:p>
             <a:r>
               <a:rPr lang="en-US" sz="2400" dirty="0" smtClean="0"/>
-              <a:t>‘leg</a:t>
-            </a:r>
-            <a:r>
-              <a:rPr lang="en-US" sz="2400" dirty="0" smtClean="0"/>
-              <a:t>’ </a:t>
+              <a:t>‘leg’ </a:t>
             </a:r>
             <a:r>
               <a:rPr lang="en-US" sz="2400" i="1" dirty="0" err="1" smtClean="0">
@@ -12514,15 +12503,7 @@
           <a:p>
             <a:r>
               <a:rPr lang="en-US" dirty="0" smtClean="0"/>
-              <a:t>Being part of </a:t>
-            </a:r>
-            <a:r>
-              <a:rPr lang="en-US" dirty="0" smtClean="0"/>
-              <a:t>a </a:t>
-            </a:r>
-            <a:r>
-              <a:rPr lang="en-US" dirty="0" smtClean="0"/>
-              <a:t>thoracic segment is a necessary condition of being in the class leg</a:t>
+              <a:t>Being part of a thoracic segment is a necessary condition of being in the class leg</a:t>
             </a:r>
           </a:p>
         </p:txBody>
@@ -12532,11 +12513,18 @@
   <p:clrMapOvr>
     <a:masterClrMapping/>
   </p:clrMapOvr>
+  <p:timing>
+    <p:tnLst>
+      <p:par>
+        <p:cTn id="1" dur="indefinite" restart="never" nodeType="tmRoot"/>
+      </p:par>
+    </p:tnLst>
+  </p:timing>
 </p:sld>
 </file>
 
 <file path=ppt/slides/slide18.xml><?xml version="1.0" encoding="utf-8"?>
-<p:sld xmlns:a="http://schemas.openxmlformats.org/drawingml/2006/main" xmlns:r="http://schemas.openxmlformats.org/officeDocument/2006/relationships" xmlns:mc="http://schemas.openxmlformats.org/markup-compatibility/2006" xmlns:mv="urn:schemas-microsoft-com:mac:vml" xmlns:p="http://schemas.openxmlformats.org/presentationml/2006/main" mc:Ignorable="mv" mc:PreserveAttributes="mv:*">
+<p:sld xmlns:a="http://schemas.openxmlformats.org/drawingml/2006/main" xmlns:r="http://schemas.openxmlformats.org/officeDocument/2006/relationships" xmlns:p="http://schemas.openxmlformats.org/presentationml/2006/main">
   <p:cSld>
     <p:spTree>
       <p:nvGrpSpPr>
@@ -12654,15 +12642,7 @@
                   <a:srgbClr val="75367A"/>
                 </a:solidFill>
               </a:rPr>
-              <a:t>some</a:t>
-            </a:r>
-            <a:r>
-              <a:rPr lang="en-US" i="1" dirty="0" smtClean="0">
-                <a:solidFill>
-                  <a:srgbClr val="75367A"/>
-                </a:solidFill>
-              </a:rPr>
-              <a:t> </a:t>
+              <a:t>some </a:t>
             </a:r>
           </a:p>
           <a:p>
@@ -12875,18 +12855,7 @@
                   </a:schemeClr>
                 </a:solidFill>
               </a:rPr>
-              <a:t>some</a:t>
-            </a:r>
-            <a:r>
-              <a:rPr lang="en-US" sz="2400" i="1" dirty="0" smtClean="0">
-                <a:solidFill>
-                  <a:schemeClr val="accent2">
-                    <a:lumMod val="75000"/>
-                    <a:lumOff val="25000"/>
-                  </a:schemeClr>
-                </a:solidFill>
-              </a:rPr>
-              <a:t> </a:t>
+              <a:t>some </a:t>
             </a:r>
             <a:r>
               <a:rPr lang="en-US" sz="2400" dirty="0" smtClean="0"/>
@@ -13009,11 +12978,18 @@
   <p:clrMapOvr>
     <a:masterClrMapping/>
   </p:clrMapOvr>
+  <p:timing>
+    <p:tnLst>
+      <p:par>
+        <p:cTn id="1" dur="indefinite" restart="never" nodeType="tmRoot"/>
+      </p:par>
+    </p:tnLst>
+  </p:timing>
 </p:sld>
 </file>
 
 <file path=ppt/slides/slide19.xml><?xml version="1.0" encoding="utf-8"?>
-<p:sld xmlns:a="http://schemas.openxmlformats.org/drawingml/2006/main" xmlns:r="http://schemas.openxmlformats.org/officeDocument/2006/relationships" xmlns:mc="http://schemas.openxmlformats.org/markup-compatibility/2006" xmlns:mv="urn:schemas-microsoft-com:mac:vml" xmlns:p="http://schemas.openxmlformats.org/presentationml/2006/main" mc:Ignorable="mv" mc:PreserveAttributes="mv:*">
+<p:sld xmlns:a="http://schemas.openxmlformats.org/drawingml/2006/main" xmlns:r="http://schemas.openxmlformats.org/officeDocument/2006/relationships" xmlns:p="http://schemas.openxmlformats.org/presentationml/2006/main">
   <p:cSld>
     <p:spTree>
       <p:nvGrpSpPr>
@@ -13079,15 +13055,7 @@
           <a:p>
             <a:r>
               <a:rPr lang="en-US" dirty="0" smtClean="0"/>
-              <a:t>‘</a:t>
-            </a:r>
-            <a:r>
-              <a:rPr lang="en-US" dirty="0" smtClean="0"/>
-              <a:t>claw’</a:t>
-            </a:r>
-            <a:r>
-              <a:rPr lang="en-US" dirty="0" smtClean="0"/>
-              <a:t> </a:t>
+              <a:t>‘claw’ </a:t>
             </a:r>
             <a:r>
               <a:rPr lang="en-US" i="1" dirty="0" err="1" smtClean="0">
@@ -13121,20 +13089,11 @@
               <a:rPr lang="en-US" dirty="0" smtClean="0"/>
               <a:t>tarsal segment’</a:t>
             </a:r>
-            <a:endParaRPr lang="en-US" dirty="0" smtClean="0"/>
           </a:p>
           <a:p>
             <a:r>
               <a:rPr lang="en-US" dirty="0" smtClean="0"/>
-              <a:t>‘</a:t>
-            </a:r>
-            <a:r>
-              <a:rPr lang="en-US" dirty="0" smtClean="0"/>
-              <a:t>tarsal segment</a:t>
-            </a:r>
-            <a:r>
-              <a:rPr lang="en-US" dirty="0" smtClean="0"/>
-              <a:t>’ </a:t>
+              <a:t>‘tarsal segment’ </a:t>
             </a:r>
             <a:r>
               <a:rPr lang="en-US" i="1" dirty="0" err="1" smtClean="0">
@@ -13642,7 +13601,7 @@
 </file>
 
 <file path=ppt/slides/slide2.xml><?xml version="1.0" encoding="utf-8"?>
-<p:sld xmlns:a="http://schemas.openxmlformats.org/drawingml/2006/main" xmlns:r="http://schemas.openxmlformats.org/officeDocument/2006/relationships" xmlns:mc="http://schemas.openxmlformats.org/markup-compatibility/2006" xmlns:mv="urn:schemas-microsoft-com:mac:vml" xmlns:p="http://schemas.openxmlformats.org/presentationml/2006/main" mc:Ignorable="mv" mc:PreserveAttributes="mv:*">
+<p:sld xmlns:a="http://schemas.openxmlformats.org/drawingml/2006/main" xmlns:r="http://schemas.openxmlformats.org/officeDocument/2006/relationships" xmlns:p="http://schemas.openxmlformats.org/presentationml/2006/main">
   <p:cSld>
     <p:spTree>
       <p:nvGrpSpPr>
@@ -13812,7 +13771,7 @@
 </file>
 
 <file path=ppt/slides/slide20.xml><?xml version="1.0" encoding="utf-8"?>
-<p:sld xmlns:a="http://schemas.openxmlformats.org/drawingml/2006/main" xmlns:r="http://schemas.openxmlformats.org/officeDocument/2006/relationships" xmlns:mc="http://schemas.openxmlformats.org/markup-compatibility/2006" xmlns:mv="urn:schemas-microsoft-com:mac:vml" xmlns:p="http://schemas.openxmlformats.org/presentationml/2006/main" mc:Ignorable="mv" mc:PreserveAttributes="mv:*">
+<p:sld xmlns:a="http://schemas.openxmlformats.org/drawingml/2006/main" xmlns:r="http://schemas.openxmlformats.org/officeDocument/2006/relationships" xmlns:p="http://schemas.openxmlformats.org/presentationml/2006/main">
   <p:cSld>
     <p:spTree>
       <p:nvGrpSpPr>
@@ -14194,11 +14153,18 @@
   <p:clrMapOvr>
     <a:masterClrMapping/>
   </p:clrMapOvr>
+  <p:timing>
+    <p:tnLst>
+      <p:par>
+        <p:cTn id="1" dur="indefinite" restart="never" nodeType="tmRoot"/>
+      </p:par>
+    </p:tnLst>
+  </p:timing>
 </p:sld>
 </file>
 
 <file path=ppt/slides/slide21.xml><?xml version="1.0" encoding="utf-8"?>
-<p:sld xmlns:a="http://schemas.openxmlformats.org/drawingml/2006/main" xmlns:r="http://schemas.openxmlformats.org/officeDocument/2006/relationships" xmlns:mc="http://schemas.openxmlformats.org/markup-compatibility/2006" xmlns:mv="urn:schemas-microsoft-com:mac:vml" xmlns:p="http://schemas.openxmlformats.org/presentationml/2006/main" mc:Ignorable="mv" mc:PreserveAttributes="mv:*">
+<p:sld xmlns:a="http://schemas.openxmlformats.org/drawingml/2006/main" xmlns:r="http://schemas.openxmlformats.org/officeDocument/2006/relationships" xmlns:p="http://schemas.openxmlformats.org/presentationml/2006/main">
   <p:cSld>
     <p:spTree>
       <p:nvGrpSpPr>
@@ -14880,7 +14846,7 @@
 </file>
 
 <file path=ppt/slides/slide22.xml><?xml version="1.0" encoding="utf-8"?>
-<p:sld xmlns:a="http://schemas.openxmlformats.org/drawingml/2006/main" xmlns:r="http://schemas.openxmlformats.org/officeDocument/2006/relationships" xmlns:mc="http://schemas.openxmlformats.org/markup-compatibility/2006" xmlns:mv="urn:schemas-microsoft-com:mac:vml" xmlns:p="http://schemas.openxmlformats.org/presentationml/2006/main" mc:Ignorable="mv" mc:PreserveAttributes="mv:*">
+<p:sld xmlns:a="http://schemas.openxmlformats.org/drawingml/2006/main" xmlns:r="http://schemas.openxmlformats.org/officeDocument/2006/relationships" xmlns:p="http://schemas.openxmlformats.org/presentationml/2006/main">
   <p:cSld>
     <p:spTree>
       <p:nvGrpSpPr>
@@ -15135,7 +15101,7 @@
 </file>
 
 <file path=ppt/slides/slide23.xml><?xml version="1.0" encoding="utf-8"?>
-<p:sld xmlns:a="http://schemas.openxmlformats.org/drawingml/2006/main" xmlns:r="http://schemas.openxmlformats.org/officeDocument/2006/relationships" xmlns:mc="http://schemas.openxmlformats.org/markup-compatibility/2006" xmlns:mv="urn:schemas-microsoft-com:mac:vml" xmlns:p="http://schemas.openxmlformats.org/presentationml/2006/main" mc:Ignorable="mv" mc:PreserveAttributes="mv:*">
+<p:sld xmlns:a="http://schemas.openxmlformats.org/drawingml/2006/main" xmlns:r="http://schemas.openxmlformats.org/officeDocument/2006/relationships" xmlns:p="http://schemas.openxmlformats.org/presentationml/2006/main">
   <p:cSld>
     <p:spTree>
       <p:nvGrpSpPr>
@@ -15229,8 +15195,13 @@
           <a:p>
             <a:r>
               <a:rPr lang="en-US" dirty="0" smtClean="0"/>
-              <a:t>Automating  classification is often hard. How would you define this using an equivalent class statement:</a:t>
-            </a:r>
+              <a:t>Automating  classification is often hard. </a:t>
+            </a:r>
+            <a:r>
+              <a:rPr lang="en-US" dirty="0" smtClean="0"/>
+              <a:t>This, for example, is too complex to formalize easily:</a:t>
+            </a:r>
+            <a:endParaRPr lang="en-US" dirty="0" smtClean="0"/>
           </a:p>
           <a:p>
             <a:pPr lvl="1"/>
@@ -15286,11 +15257,18 @@
   <p:clrMapOvr>
     <a:masterClrMapping/>
   </p:clrMapOvr>
+  <p:timing>
+    <p:tnLst>
+      <p:par>
+        <p:cTn id="1" dur="indefinite" restart="never" nodeType="tmRoot"/>
+      </p:par>
+    </p:tnLst>
+  </p:timing>
 </p:sld>
 </file>
 
 <file path=ppt/slides/slide24.xml><?xml version="1.0" encoding="utf-8"?>
-<p:sld xmlns:a="http://schemas.openxmlformats.org/drawingml/2006/main" xmlns:r="http://schemas.openxmlformats.org/officeDocument/2006/relationships" xmlns:mc="http://schemas.openxmlformats.org/markup-compatibility/2006" xmlns:mv="urn:schemas-microsoft-com:mac:vml" xmlns:p="http://schemas.openxmlformats.org/presentationml/2006/main" mc:Ignorable="mv" mc:PreserveAttributes="mv:*">
+<p:sld xmlns:a="http://schemas.openxmlformats.org/drawingml/2006/main" xmlns:r="http://schemas.openxmlformats.org/officeDocument/2006/relationships" xmlns:p="http://schemas.openxmlformats.org/presentationml/2006/main">
   <p:cSld>
     <p:spTree>
       <p:nvGrpSpPr>
@@ -15535,11 +15513,7 @@
             </a:r>
             <a:r>
               <a:rPr lang="en-US" sz="1838" dirty="0" smtClean="0"/>
-              <a:t>Any sense organ that functions in the detection of smell is an olfactory sense </a:t>
-            </a:r>
-            <a:r>
-              <a:rPr lang="en-US" sz="1838" dirty="0" smtClean="0"/>
-              <a:t>organ</a:t>
+              <a:t>Any sense organ that functions in the detection of smell is an olfactory sense organ</a:t>
             </a:r>
           </a:p>
           <a:p>
@@ -15595,11 +15569,6 @@
               </a:rPr>
               <a:t>‘sense organ’ </a:t>
             </a:r>
-            <a:endParaRPr lang="en-US" dirty="0" smtClean="0">
-              <a:solidFill>
-                <a:schemeClr val="tx1"/>
-              </a:solidFill>
-            </a:endParaRPr>
           </a:p>
           <a:p>
             <a:pPr lvl="1">
@@ -15630,18 +15599,7 @@
                   </a:schemeClr>
                 </a:solidFill>
               </a:rPr>
-              <a:t>some</a:t>
-            </a:r>
-            <a:r>
-              <a:rPr lang="en-US" i="1" dirty="0" smtClean="0">
-                <a:solidFill>
-                  <a:schemeClr val="accent2">
-                    <a:lumMod val="50000"/>
-                    <a:lumOff val="50000"/>
-                  </a:schemeClr>
-                </a:solidFill>
-              </a:rPr>
-              <a:t> </a:t>
+              <a:t>some </a:t>
             </a:r>
             <a:r>
               <a:rPr lang="en-US" dirty="0" smtClean="0"/>
@@ -15688,11 +15646,7 @@
             </a:r>
             <a:r>
               <a:rPr lang="en-US" dirty="0" smtClean="0"/>
-              <a:t>:  sense </a:t>
-            </a:r>
-            <a:r>
-              <a:rPr lang="en-US" dirty="0" smtClean="0"/>
-              <a:t>organ</a:t>
+              <a:t>:  sense organ</a:t>
             </a:r>
           </a:p>
           <a:p>
@@ -15703,11 +15657,7 @@
             </a:r>
             <a:r>
               <a:rPr lang="en-US" dirty="0" smtClean="0"/>
-              <a:t>:</a:t>
-            </a:r>
-            <a:r>
-              <a:rPr lang="en-US" dirty="0" smtClean="0"/>
-              <a:t> </a:t>
+              <a:t>: </a:t>
             </a:r>
             <a:r>
               <a:rPr lang="en-US" dirty="0" err="1" smtClean="0"/>
@@ -15717,7 +15667,6 @@
               <a:rPr lang="en-US" dirty="0" smtClean="0"/>
               <a:t> detection</a:t>
             </a:r>
-            <a:endParaRPr lang="en-US" dirty="0" smtClean="0"/>
           </a:p>
           <a:p>
             <a:pPr lvl="1">
@@ -15725,11 +15674,7 @@
             </a:pPr>
             <a:r>
               <a:rPr lang="en-US" dirty="0" smtClean="0"/>
-              <a:t>of </a:t>
-            </a:r>
-            <a:r>
-              <a:rPr lang="en-US" dirty="0" smtClean="0"/>
-              <a:t>smell</a:t>
+              <a:t>of smell</a:t>
             </a:r>
           </a:p>
           <a:p>
@@ -15820,11 +15765,18 @@
   <p:clrMapOvr>
     <a:masterClrMapping/>
   </p:clrMapOvr>
+  <p:timing>
+    <p:tnLst>
+      <p:par>
+        <p:cTn id="1" dur="indefinite" restart="never" nodeType="tmRoot"/>
+      </p:par>
+    </p:tnLst>
+  </p:timing>
 </p:sld>
 </file>
 
 <file path=ppt/slides/slide25.xml><?xml version="1.0" encoding="utf-8"?>
-<p:sld xmlns:a="http://schemas.openxmlformats.org/drawingml/2006/main" xmlns:r="http://schemas.openxmlformats.org/officeDocument/2006/relationships" xmlns:mc="http://schemas.openxmlformats.org/markup-compatibility/2006" xmlns:mv="urn:schemas-microsoft-com:mac:vml" xmlns:p="http://schemas.openxmlformats.org/presentationml/2006/main" mc:Ignorable="mv" mc:PreserveAttributes="mv:*">
+<p:sld xmlns:a="http://schemas.openxmlformats.org/drawingml/2006/main" xmlns:r="http://schemas.openxmlformats.org/officeDocument/2006/relationships" xmlns:p="http://schemas.openxmlformats.org/presentationml/2006/main">
   <p:cSld>
     <p:spTree>
       <p:nvGrpSpPr>
@@ -16575,11 +16527,18 @@
   <p:clrMapOvr>
     <a:masterClrMapping/>
   </p:clrMapOvr>
+  <p:timing>
+    <p:tnLst>
+      <p:par>
+        <p:cTn id="1" dur="indefinite" restart="never" nodeType="tmRoot"/>
+      </p:par>
+    </p:tnLst>
+  </p:timing>
 </p:sld>
 </file>
 
 <file path=ppt/slides/slide26.xml><?xml version="1.0" encoding="utf-8"?>
-<p:sld xmlns:a="http://schemas.openxmlformats.org/drawingml/2006/main" xmlns:r="http://schemas.openxmlformats.org/officeDocument/2006/relationships" xmlns:mc="http://schemas.openxmlformats.org/markup-compatibility/2006" xmlns:mv="urn:schemas-microsoft-com:mac:vml" xmlns:p="http://schemas.openxmlformats.org/presentationml/2006/main" mc:Ignorable="mv" mc:PreserveAttributes="mv:*">
+<p:sld xmlns:a="http://schemas.openxmlformats.org/drawingml/2006/main" xmlns:r="http://schemas.openxmlformats.org/officeDocument/2006/relationships" xmlns:p="http://schemas.openxmlformats.org/presentationml/2006/main">
   <p:cSld>
     <p:spTree>
       <p:nvGrpSpPr>
@@ -17305,7 +17264,7 @@
 </file>
 
 <file path=ppt/slides/slide27.xml><?xml version="1.0" encoding="utf-8"?>
-<p:sld xmlns:a="http://schemas.openxmlformats.org/drawingml/2006/main" xmlns:r="http://schemas.openxmlformats.org/officeDocument/2006/relationships" xmlns:mc="http://schemas.openxmlformats.org/markup-compatibility/2006" xmlns:mv="urn:schemas-microsoft-com:mac:vml" xmlns:p="http://schemas.openxmlformats.org/presentationml/2006/main" mc:Ignorable="mv" mc:PreserveAttributes="mv:*">
+<p:sld xmlns:a="http://schemas.openxmlformats.org/drawingml/2006/main" xmlns:r="http://schemas.openxmlformats.org/officeDocument/2006/relationships" xmlns:p="http://schemas.openxmlformats.org/presentationml/2006/main">
   <p:cSld>
     <p:spTree>
       <p:nvGrpSpPr>
@@ -17369,7 +17328,7 @@
 </file>
 
 <file path=ppt/slides/slide28.xml><?xml version="1.0" encoding="utf-8"?>
-<p:sld xmlns:a="http://schemas.openxmlformats.org/drawingml/2006/main" xmlns:r="http://schemas.openxmlformats.org/officeDocument/2006/relationships" xmlns:mc="http://schemas.openxmlformats.org/markup-compatibility/2006" xmlns:mv="urn:schemas-microsoft-com:mac:vml" xmlns:p="http://schemas.openxmlformats.org/presentationml/2006/main" mc:Ignorable="mv" mc:PreserveAttributes="mv:*">
+<p:sld xmlns:a="http://schemas.openxmlformats.org/drawingml/2006/main" xmlns:r="http://schemas.openxmlformats.org/officeDocument/2006/relationships" xmlns:p="http://schemas.openxmlformats.org/presentationml/2006/main">
   <p:cSld>
     <p:spTree>
       <p:nvGrpSpPr>
@@ -17402,15 +17361,7 @@
           <a:p>
             <a:r>
               <a:rPr lang="en-US" dirty="0" smtClean="0"/>
-              <a:t>Some classes don’t</a:t>
-            </a:r>
-            <a:r>
-              <a:rPr lang="en-US" dirty="0" smtClean="0"/>
-              <a:t> </a:t>
-            </a:r>
-            <a:r>
-              <a:rPr lang="en-US" dirty="0" smtClean="0"/>
-              <a:t>intersect</a:t>
+              <a:t>Some classes don’t intersect</a:t>
             </a:r>
             <a:endParaRPr lang="en-US" dirty="0"/>
           </a:p>
@@ -17790,11 +17741,18 @@
   <p:clrMapOvr>
     <a:masterClrMapping/>
   </p:clrMapOvr>
+  <p:timing>
+    <p:tnLst>
+      <p:par>
+        <p:cTn id="1" dur="indefinite" restart="never" nodeType="tmRoot"/>
+      </p:par>
+    </p:tnLst>
+  </p:timing>
 </p:sld>
 </file>
 
 <file path=ppt/slides/slide29.xml><?xml version="1.0" encoding="utf-8"?>
-<p:sld xmlns:a="http://schemas.openxmlformats.org/drawingml/2006/main" xmlns:r="http://schemas.openxmlformats.org/officeDocument/2006/relationships" xmlns:mc="http://schemas.openxmlformats.org/markup-compatibility/2006" xmlns:mv="urn:schemas-microsoft-com:mac:vml" xmlns:p="http://schemas.openxmlformats.org/presentationml/2006/main" mc:Ignorable="mv" mc:PreserveAttributes="mv:*">
+<p:sld xmlns:a="http://schemas.openxmlformats.org/drawingml/2006/main" xmlns:r="http://schemas.openxmlformats.org/officeDocument/2006/relationships" xmlns:p="http://schemas.openxmlformats.org/presentationml/2006/main">
   <p:cSld>
     <p:spTree>
       <p:nvGrpSpPr>
@@ -18265,22 +18223,14 @@
             <a:pPr algn="ctr"/>
             <a:r>
               <a:rPr lang="en-US" dirty="0" smtClean="0"/>
-              <a:t>lumen</a:t>
-            </a:r>
+              <a:t>lumen </a:t>
+            </a:r>
+          </a:p>
+          <a:p>
+            <a:pPr algn="ctr"/>
             <a:r>
               <a:rPr lang="en-US" dirty="0" smtClean="0"/>
-              <a:t> </a:t>
-            </a:r>
-          </a:p>
-          <a:p>
-            <a:pPr algn="ctr"/>
-            <a:r>
-              <a:rPr lang="en-US" dirty="0" smtClean="0"/>
-              <a:t>of </a:t>
-            </a:r>
-            <a:r>
-              <a:rPr lang="en-US" dirty="0" smtClean="0"/>
-              <a:t>gut</a:t>
+              <a:t>of gut</a:t>
             </a:r>
           </a:p>
           <a:p>
@@ -18330,11 +18280,18 @@
   <p:clrMapOvr>
     <a:masterClrMapping/>
   </p:clrMapOvr>
+  <p:timing>
+    <p:tnLst>
+      <p:par>
+        <p:cTn id="1" dur="indefinite" restart="never" nodeType="tmRoot"/>
+      </p:par>
+    </p:tnLst>
+  </p:timing>
 </p:sld>
 </file>
 
 <file path=ppt/slides/slide3.xml><?xml version="1.0" encoding="utf-8"?>
-<p:sld xmlns:a="http://schemas.openxmlformats.org/drawingml/2006/main" xmlns:r="http://schemas.openxmlformats.org/officeDocument/2006/relationships" xmlns:mc="http://schemas.openxmlformats.org/markup-compatibility/2006" xmlns:mv="urn:schemas-microsoft-com:mac:vml" xmlns:p="http://schemas.openxmlformats.org/presentationml/2006/main" mc:Ignorable="mv" mc:PreserveAttributes="mv:*">
+<p:sld xmlns:a="http://schemas.openxmlformats.org/drawingml/2006/main" xmlns:r="http://schemas.openxmlformats.org/officeDocument/2006/relationships" xmlns:p="http://schemas.openxmlformats.org/presentationml/2006/main">
   <p:cSld>
     <p:spTree>
       <p:nvGrpSpPr>
@@ -18514,7 +18471,7 @@
 </file>
 
 <file path=ppt/slides/slide30.xml><?xml version="1.0" encoding="utf-8"?>
-<p:sld xmlns:a="http://schemas.openxmlformats.org/drawingml/2006/main" xmlns:r="http://schemas.openxmlformats.org/officeDocument/2006/relationships" xmlns:mc="http://schemas.openxmlformats.org/markup-compatibility/2006" xmlns:mv="urn:schemas-microsoft-com:mac:vml" xmlns:p="http://schemas.openxmlformats.org/presentationml/2006/main" mc:Ignorable="mv" mc:PreserveAttributes="mv:*">
+<p:sld xmlns:a="http://schemas.openxmlformats.org/drawingml/2006/main" xmlns:r="http://schemas.openxmlformats.org/officeDocument/2006/relationships" xmlns:p="http://schemas.openxmlformats.org/presentationml/2006/main">
   <p:cSld>
     <p:spTree>
       <p:nvGrpSpPr>
@@ -19024,22 +18981,14 @@
             <a:pPr algn="ctr"/>
             <a:r>
               <a:rPr lang="en-US" dirty="0" smtClean="0"/>
-              <a:t>lumen</a:t>
-            </a:r>
+              <a:t>lumen </a:t>
+            </a:r>
+          </a:p>
+          <a:p>
+            <a:pPr algn="ctr"/>
             <a:r>
               <a:rPr lang="en-US" dirty="0" smtClean="0"/>
-              <a:t> </a:t>
-            </a:r>
-          </a:p>
-          <a:p>
-            <a:pPr algn="ctr"/>
-            <a:r>
-              <a:rPr lang="en-US" dirty="0" smtClean="0"/>
-              <a:t>of </a:t>
-            </a:r>
-            <a:r>
-              <a:rPr lang="en-US" dirty="0" smtClean="0"/>
-              <a:t>gut</a:t>
+              <a:t>of gut</a:t>
             </a:r>
           </a:p>
           <a:p>
@@ -19202,11 +19151,18 @@
   <p:clrMapOvr>
     <a:masterClrMapping/>
   </p:clrMapOvr>
+  <p:timing>
+    <p:tnLst>
+      <p:par>
+        <p:cTn id="1" dur="indefinite" restart="never" nodeType="tmRoot"/>
+      </p:par>
+    </p:tnLst>
+  </p:timing>
 </p:sld>
 </file>
 
 <file path=ppt/slides/slide31.xml><?xml version="1.0" encoding="utf-8"?>
-<p:sld xmlns:a="http://schemas.openxmlformats.org/drawingml/2006/main" xmlns:r="http://schemas.openxmlformats.org/officeDocument/2006/relationships" xmlns:mc="http://schemas.openxmlformats.org/markup-compatibility/2006" xmlns:mv="urn:schemas-microsoft-com:mac:vml" xmlns:p="http://schemas.openxmlformats.org/presentationml/2006/main" mc:Ignorable="mv" mc:PreserveAttributes="mv:*">
+<p:sld xmlns:a="http://schemas.openxmlformats.org/drawingml/2006/main" xmlns:r="http://schemas.openxmlformats.org/officeDocument/2006/relationships" xmlns:p="http://schemas.openxmlformats.org/presentationml/2006/main">
   <p:cSld>
     <p:spTree>
       <p:nvGrpSpPr>
@@ -20217,11 +20173,18 @@
   <p:clrMapOvr>
     <a:masterClrMapping/>
   </p:clrMapOvr>
+  <p:timing>
+    <p:tnLst>
+      <p:par>
+        <p:cTn id="1" dur="indefinite" restart="never" nodeType="tmRoot"/>
+      </p:par>
+    </p:tnLst>
+  </p:timing>
 </p:sld>
 </file>
 
 <file path=ppt/slides/slide32.xml><?xml version="1.0" encoding="utf-8"?>
-<p:sld xmlns:a="http://schemas.openxmlformats.org/drawingml/2006/main" xmlns:r="http://schemas.openxmlformats.org/officeDocument/2006/relationships" xmlns:mc="http://schemas.openxmlformats.org/markup-compatibility/2006" xmlns:mv="urn:schemas-microsoft-com:mac:vml" xmlns:p="http://schemas.openxmlformats.org/presentationml/2006/main" mc:Ignorable="mv" mc:PreserveAttributes="mv:*">
+<p:sld xmlns:a="http://schemas.openxmlformats.org/drawingml/2006/main" xmlns:r="http://schemas.openxmlformats.org/officeDocument/2006/relationships" xmlns:p="http://schemas.openxmlformats.org/presentationml/2006/main">
   <p:cSld>
     <p:spTree>
       <p:nvGrpSpPr>
@@ -20707,7 +20670,6 @@
               <a:rPr lang="en-US" dirty="0" smtClean="0"/>
               <a:t>anatomical </a:t>
             </a:r>
-            <a:endParaRPr lang="en-US" dirty="0" smtClean="0"/>
           </a:p>
           <a:p>
             <a:pPr algn="r"/>
@@ -20891,11 +20853,18 @@
   <p:clrMapOvr>
     <a:masterClrMapping/>
   </p:clrMapOvr>
+  <p:timing>
+    <p:tnLst>
+      <p:par>
+        <p:cTn id="1" dur="indefinite" restart="never" nodeType="tmRoot"/>
+      </p:par>
+    </p:tnLst>
+  </p:timing>
 </p:sld>
 </file>
 
 <file path=ppt/slides/slide33.xml><?xml version="1.0" encoding="utf-8"?>
-<p:sld xmlns:a="http://schemas.openxmlformats.org/drawingml/2006/main" xmlns:r="http://schemas.openxmlformats.org/officeDocument/2006/relationships" xmlns:mc="http://schemas.openxmlformats.org/markup-compatibility/2006" xmlns:mv="urn:schemas-microsoft-com:mac:vml" xmlns:p="http://schemas.openxmlformats.org/presentationml/2006/main" mc:Ignorable="mv" mc:PreserveAttributes="mv:*">
+<p:sld xmlns:a="http://schemas.openxmlformats.org/drawingml/2006/main" xmlns:r="http://schemas.openxmlformats.org/officeDocument/2006/relationships" xmlns:p="http://schemas.openxmlformats.org/presentationml/2006/main">
   <p:cSld>
     <p:spTree>
       <p:nvGrpSpPr>
@@ -21471,11 +21440,7 @@
             <a:pPr algn="r"/>
             <a:r>
               <a:rPr lang="en-US" sz="2400" dirty="0" smtClean="0"/>
-              <a:t>detection of smell </a:t>
-            </a:r>
-            <a:r>
-              <a:rPr lang="en-US" sz="2400" dirty="0" smtClean="0"/>
-              <a:t> </a:t>
+              <a:t>detection of smell  </a:t>
             </a:r>
             <a:r>
               <a:rPr lang="en-US" sz="2400" i="1" dirty="0" err="1" smtClean="0">
@@ -21510,18 +21475,7 @@
                   </a:schemeClr>
                 </a:solidFill>
               </a:rPr>
-              <a:t>some</a:t>
-            </a:r>
-            <a:r>
-              <a:rPr lang="en-US" sz="2400" i="1" dirty="0" smtClean="0">
-                <a:solidFill>
-                  <a:schemeClr val="tx2">
-                    <a:lumMod val="75000"/>
-                    <a:lumOff val="25000"/>
-                  </a:schemeClr>
-                </a:solidFill>
-              </a:rPr>
-              <a:t> </a:t>
+              <a:t>some </a:t>
             </a:r>
             <a:r>
               <a:rPr lang="en-US" sz="2400" dirty="0" smtClean="0"/>
@@ -21982,11 +21936,18 @@
   <p:clrMapOvr>
     <a:masterClrMapping/>
   </p:clrMapOvr>
+  <p:timing>
+    <p:tnLst>
+      <p:par>
+        <p:cTn id="1" dur="indefinite" restart="never" nodeType="tmRoot"/>
+      </p:par>
+    </p:tnLst>
+  </p:timing>
 </p:sld>
 </file>
 
 <file path=ppt/slides/slide34.xml><?xml version="1.0" encoding="utf-8"?>
-<p:sld xmlns:a="http://schemas.openxmlformats.org/drawingml/2006/main" xmlns:r="http://schemas.openxmlformats.org/officeDocument/2006/relationships" xmlns:mc="http://schemas.openxmlformats.org/markup-compatibility/2006" xmlns:mv="urn:schemas-microsoft-com:mac:vml" xmlns:p="http://schemas.openxmlformats.org/presentationml/2006/main" mc:Ignorable="mv" mc:PreserveAttributes="mv:*">
+<p:sld xmlns:a="http://schemas.openxmlformats.org/drawingml/2006/main" xmlns:r="http://schemas.openxmlformats.org/officeDocument/2006/relationships" xmlns:p="http://schemas.openxmlformats.org/presentationml/2006/main">
   <p:cSld>
     <p:spTree>
       <p:nvGrpSpPr>
@@ -22508,11 +22469,18 @@
   <p:clrMapOvr>
     <a:masterClrMapping/>
   </p:clrMapOvr>
+  <p:timing>
+    <p:tnLst>
+      <p:par>
+        <p:cTn id="1" dur="indefinite" restart="never" nodeType="tmRoot"/>
+      </p:par>
+    </p:tnLst>
+  </p:timing>
 </p:sld>
 </file>
 
 <file path=ppt/slides/slide35.xml><?xml version="1.0" encoding="utf-8"?>
-<p:sld xmlns:a="http://schemas.openxmlformats.org/drawingml/2006/main" xmlns:r="http://schemas.openxmlformats.org/officeDocument/2006/relationships" xmlns:mc="http://schemas.openxmlformats.org/markup-compatibility/2006" xmlns:mv="urn:schemas-microsoft-com:mac:vml" xmlns:p="http://schemas.openxmlformats.org/presentationml/2006/main" mc:Ignorable="mv" mc:PreserveAttributes="mv:*">
+<p:sld xmlns:a="http://schemas.openxmlformats.org/drawingml/2006/main" xmlns:r="http://schemas.openxmlformats.org/officeDocument/2006/relationships" xmlns:p="http://schemas.openxmlformats.org/presentationml/2006/main">
   <p:cSld>
     <p:spTree>
       <p:nvGrpSpPr>
@@ -22584,28 +22552,13 @@
             </a:r>
             <a:r>
               <a:rPr lang="en-US" sz="2400" b="1" dirty="0" smtClean="0"/>
-              <a:t> regulates </a:t>
-            </a:r>
-            <a:r>
-              <a:rPr lang="en-US" sz="2400" i="1" dirty="0" smtClean="0">
-                <a:solidFill>
-                  <a:srgbClr val="75367A"/>
-                </a:solidFill>
-              </a:rPr>
-              <a:t>some</a:t>
-            </a:r>
-            <a:r>
-              <a:rPr lang="en-US" sz="2400" dirty="0" smtClean="0">
-                <a:solidFill>
-                  <a:srgbClr val="75367A"/>
-                </a:solidFill>
-              </a:rPr>
-              <a:t> </a:t>
+              <a:t> occurs in </a:t>
             </a:r>
             <a:r>
               <a:rPr lang="en-US" sz="2400" dirty="0" smtClean="0"/>
               <a:t>Y</a:t>
             </a:r>
+            <a:endParaRPr lang="en-US" sz="2400" dirty="0" smtClean="0"/>
           </a:p>
           <a:p>
             <a:r>
@@ -22619,14 +22572,6 @@
             <a:r>
               <a:rPr lang="en-US" sz="2400" b="1" dirty="0" smtClean="0"/>
               <a:t> </a:t>
-            </a:r>
-            <a:r>
-              <a:rPr lang="en-US" sz="2400" i="1" dirty="0" smtClean="0">
-                <a:solidFill>
-                  <a:srgbClr val="75367A"/>
-                </a:solidFill>
-              </a:rPr>
-              <a:t>some </a:t>
             </a:r>
             <a:r>
               <a:rPr lang="en-US" sz="2400" i="1" dirty="0" smtClean="0"/>
@@ -22718,7 +22663,7 @@
                   <a:srgbClr val="000000"/>
                 </a:solidFill>
               </a:rPr>
-              <a:t>regulates</a:t>
+              <a:t>‘occurs in’</a:t>
             </a:r>
             <a:endParaRPr lang="en-US" dirty="0">
               <a:solidFill>
@@ -22800,7 +22745,7 @@
           <a:p>
             <a:r>
               <a:rPr lang="en-US" dirty="0" smtClean="0"/>
-              <a:t>regulates</a:t>
+              <a:t>‘occurs in’</a:t>
             </a:r>
             <a:endParaRPr lang="en-US" dirty="0"/>
           </a:p>
@@ -22922,7 +22867,7 @@
         <p:spPr>
           <a:xfrm>
             <a:off x="4773579" y="5014731"/>
-            <a:ext cx="2951649" cy="830997"/>
+            <a:ext cx="2101857" cy="830997"/>
           </a:xfrm>
           <a:prstGeom prst="rect">
             <a:avLst/>
@@ -22941,28 +22886,13 @@
             </a:r>
             <a:r>
               <a:rPr lang="en-US" sz="2400" b="1" dirty="0" smtClean="0"/>
-              <a:t> regulates </a:t>
-            </a:r>
-            <a:r>
-              <a:rPr lang="en-US" sz="2400" i="1" dirty="0" smtClean="0">
-                <a:solidFill>
-                  <a:srgbClr val="75367A"/>
-                </a:solidFill>
-              </a:rPr>
-              <a:t>some</a:t>
-            </a:r>
-            <a:r>
-              <a:rPr lang="en-US" sz="2400" dirty="0" smtClean="0">
-                <a:solidFill>
-                  <a:srgbClr val="75367A"/>
-                </a:solidFill>
-              </a:rPr>
-              <a:t> </a:t>
+              <a:t> occurs in </a:t>
             </a:r>
             <a:r>
               <a:rPr lang="en-US" sz="2400" dirty="0" smtClean="0"/>
               <a:t>Z</a:t>
             </a:r>
+            <a:endParaRPr lang="en-US" sz="2400" dirty="0" smtClean="0"/>
           </a:p>
           <a:p>
             <a:endParaRPr lang="en-US" sz="2400" dirty="0"/>
@@ -22971,7 +22901,7 @@
       </p:sp>
       <p:pic>
         <p:nvPicPr>
-          <p:cNvPr id="19" name="Picture 18"/>
+          <p:cNvPr id="3" name="Picture 2"/>
           <p:cNvPicPr>
             <a:picLocks noChangeAspect="1"/>
           </p:cNvPicPr>
@@ -22985,8 +22915,8 @@
         </p:blipFill>
         <p:spPr>
           <a:xfrm>
-            <a:off x="450732" y="1869084"/>
-            <a:ext cx="7594600" cy="787400"/>
+            <a:off x="1068283" y="2140930"/>
+            <a:ext cx="6304118" cy="375073"/>
           </a:xfrm>
           <a:prstGeom prst="rect">
             <a:avLst/>
@@ -22998,11 +22928,18 @@
   <p:clrMapOvr>
     <a:masterClrMapping/>
   </p:clrMapOvr>
+  <p:timing>
+    <p:tnLst>
+      <p:par>
+        <p:cTn id="1" dur="indefinite" restart="never" nodeType="tmRoot"/>
+      </p:par>
+    </p:tnLst>
+  </p:timing>
 </p:sld>
 </file>
 
 <file path=ppt/slides/slide36.xml><?xml version="1.0" encoding="utf-8"?>
-<p:sld xmlns:a="http://schemas.openxmlformats.org/drawingml/2006/main" xmlns:r="http://schemas.openxmlformats.org/officeDocument/2006/relationships" xmlns:mc="http://schemas.openxmlformats.org/markup-compatibility/2006" xmlns:mv="urn:schemas-microsoft-com:mac:vml" xmlns:p="http://schemas.openxmlformats.org/presentationml/2006/main" mc:Ignorable="mv" mc:PreserveAttributes="mv:*">
+<p:sld xmlns:a="http://schemas.openxmlformats.org/drawingml/2006/main" xmlns:r="http://schemas.openxmlformats.org/officeDocument/2006/relationships" xmlns:p="http://schemas.openxmlformats.org/presentationml/2006/main">
   <p:cSld>
     <p:spTree>
       <p:nvGrpSpPr>
@@ -23182,7 +23119,7 @@
 </file>
 
 <file path=ppt/slides/slide4.xml><?xml version="1.0" encoding="utf-8"?>
-<p:sld xmlns:a="http://schemas.openxmlformats.org/drawingml/2006/main" xmlns:r="http://schemas.openxmlformats.org/officeDocument/2006/relationships" xmlns:mc="http://schemas.openxmlformats.org/markup-compatibility/2006" xmlns:mv="urn:schemas-microsoft-com:mac:vml" xmlns:p="http://schemas.openxmlformats.org/presentationml/2006/main" mc:Ignorable="mv" mc:PreserveAttributes="mv:*">
+<p:sld xmlns:a="http://schemas.openxmlformats.org/drawingml/2006/main" xmlns:r="http://schemas.openxmlformats.org/officeDocument/2006/relationships" xmlns:p="http://schemas.openxmlformats.org/presentationml/2006/main">
   <p:cSld>
     <p:spTree>
       <p:nvGrpSpPr>
@@ -23478,7 +23415,7 @@
 </file>
 
 <file path=ppt/slides/slide5.xml><?xml version="1.0" encoding="utf-8"?>
-<p:sld xmlns:a="http://schemas.openxmlformats.org/drawingml/2006/main" xmlns:r="http://schemas.openxmlformats.org/officeDocument/2006/relationships" xmlns:mc="http://schemas.openxmlformats.org/markup-compatibility/2006" xmlns:mv="urn:schemas-microsoft-com:mac:vml" xmlns:p="http://schemas.openxmlformats.org/presentationml/2006/main" mc:Ignorable="mv" mc:PreserveAttributes="mv:*">
+<p:sld xmlns:a="http://schemas.openxmlformats.org/drawingml/2006/main" xmlns:r="http://schemas.openxmlformats.org/officeDocument/2006/relationships" xmlns:p="http://schemas.openxmlformats.org/presentationml/2006/main">
   <p:cSld>
     <p:spTree>
       <p:nvGrpSpPr>
@@ -23800,7 +23737,7 @@
 </file>
 
 <file path=ppt/slides/slide6.xml><?xml version="1.0" encoding="utf-8"?>
-<p:sld xmlns:a="http://schemas.openxmlformats.org/drawingml/2006/main" xmlns:r="http://schemas.openxmlformats.org/officeDocument/2006/relationships" xmlns:mc="http://schemas.openxmlformats.org/markup-compatibility/2006" xmlns:mv="urn:schemas-microsoft-com:mac:vml" xmlns:p="http://schemas.openxmlformats.org/presentationml/2006/main" mc:Ignorable="mv" mc:PreserveAttributes="mv:*">
+<p:sld xmlns:a="http://schemas.openxmlformats.org/drawingml/2006/main" xmlns:r="http://schemas.openxmlformats.org/officeDocument/2006/relationships" xmlns:p="http://schemas.openxmlformats.org/presentationml/2006/main">
   <p:cSld>
     <p:spTree>
       <p:nvGrpSpPr>
@@ -24009,7 +23946,7 @@
 </file>
 
 <file path=ppt/slides/slide7.xml><?xml version="1.0" encoding="utf-8"?>
-<p:sld xmlns:a="http://schemas.openxmlformats.org/drawingml/2006/main" xmlns:r="http://schemas.openxmlformats.org/officeDocument/2006/relationships" xmlns:mc="http://schemas.openxmlformats.org/markup-compatibility/2006" xmlns:mv="urn:schemas-microsoft-com:mac:vml" xmlns:p="http://schemas.openxmlformats.org/presentationml/2006/main" mc:Ignorable="mv" mc:PreserveAttributes="mv:*">
+<p:sld xmlns:a="http://schemas.openxmlformats.org/drawingml/2006/main" xmlns:r="http://schemas.openxmlformats.org/officeDocument/2006/relationships" xmlns:p="http://schemas.openxmlformats.org/presentationml/2006/main">
   <p:cSld>
     <p:spTree>
       <p:nvGrpSpPr>
@@ -24080,11 +24017,7 @@
             <a:pPr lvl="1"/>
             <a:r>
               <a:rPr lang="en-US" dirty="0" smtClean="0"/>
-              <a:t>OBO name </a:t>
-            </a:r>
-            <a:r>
-              <a:rPr lang="en-US" dirty="0" smtClean="0"/>
-              <a:t>= </a:t>
+              <a:t>OBO name = </a:t>
             </a:r>
             <a:r>
               <a:rPr lang="en-US" dirty="0" err="1" smtClean="0"/>
@@ -24096,15 +24029,7 @@
             <a:pPr lvl="1"/>
             <a:r>
               <a:rPr lang="en-US" dirty="0" smtClean="0"/>
-              <a:t>OBO def </a:t>
-            </a:r>
-            <a:r>
-              <a:rPr lang="en-US" dirty="0" smtClean="0"/>
-              <a:t>=</a:t>
-            </a:r>
-            <a:r>
-              <a:rPr lang="en-US" dirty="0" smtClean="0"/>
-              <a:t> </a:t>
+              <a:t>OBO def = </a:t>
             </a:r>
             <a:r>
               <a:rPr lang="en-US" dirty="0" err="1" smtClean="0"/>
@@ -24153,11 +24078,18 @@
   <p:clrMapOvr>
     <a:masterClrMapping/>
   </p:clrMapOvr>
+  <p:timing>
+    <p:tnLst>
+      <p:par>
+        <p:cTn id="1" dur="indefinite" restart="never" nodeType="tmRoot"/>
+      </p:par>
+    </p:tnLst>
+  </p:timing>
 </p:sld>
 </file>
 
 <file path=ppt/slides/slide8.xml><?xml version="1.0" encoding="utf-8"?>
-<p:sld xmlns:a="http://schemas.openxmlformats.org/drawingml/2006/main" xmlns:r="http://schemas.openxmlformats.org/officeDocument/2006/relationships" xmlns:mc="http://schemas.openxmlformats.org/markup-compatibility/2006" xmlns:mv="urn:schemas-microsoft-com:mac:vml" xmlns:p="http://schemas.openxmlformats.org/presentationml/2006/main" mc:Ignorable="mv" mc:PreserveAttributes="mv:*">
+<p:sld xmlns:a="http://schemas.openxmlformats.org/drawingml/2006/main" xmlns:r="http://schemas.openxmlformats.org/officeDocument/2006/relationships" xmlns:p="http://schemas.openxmlformats.org/presentationml/2006/main">
   <p:cSld>
     <p:spTree>
       <p:nvGrpSpPr>
@@ -24669,7 +24601,7 @@
 </file>
 
 <file path=ppt/slides/slide9.xml><?xml version="1.0" encoding="utf-8"?>
-<p:sld xmlns:a="http://schemas.openxmlformats.org/drawingml/2006/main" xmlns:r="http://schemas.openxmlformats.org/officeDocument/2006/relationships" xmlns:mc="http://schemas.openxmlformats.org/markup-compatibility/2006" xmlns:mv="urn:schemas-microsoft-com:mac:vml" xmlns:p="http://schemas.openxmlformats.org/presentationml/2006/main" mc:Ignorable="mv" mc:PreserveAttributes="mv:*">
+<p:sld xmlns:a="http://schemas.openxmlformats.org/drawingml/2006/main" xmlns:r="http://schemas.openxmlformats.org/officeDocument/2006/relationships" xmlns:p="http://schemas.openxmlformats.org/presentationml/2006/main">
   <p:cSld>
     <p:spTree>
       <p:nvGrpSpPr>

</xml_diff>